<commit_message>
Improve Apresentacao IMprove RoadMap
</commit_message>
<xml_diff>
--- a/Apresentações/TRE DMAIC - Improve.pptx
+++ b/Apresentações/TRE DMAIC - Improve.pptx
@@ -9,6 +9,10 @@
     <p:sldId id="257" r:id="rId3"/>
     <p:sldId id="258" r:id="rId4"/>
     <p:sldId id="259" r:id="rId5"/>
+    <p:sldId id="260" r:id="rId6"/>
+    <p:sldId id="261" r:id="rId7"/>
+    <p:sldId id="262" r:id="rId8"/>
+    <p:sldId id="263" r:id="rId9"/>
   </p:sldIdLst>
   <p:sldSz cx="12192000" cy="6858000"/>
   <p:notesSz cx="6858000" cy="9144000"/>
@@ -107,6 +111,11 @@
       </a:defRPr>
     </a:lvl9pPr>
   </p:defaultTextStyle>
+  <p:extLst>
+    <p:ext uri="{EFAFB233-063F-42B5-8137-9DF3F51BA10A}">
+      <p15:sldGuideLst xmlns:p15="http://schemas.microsoft.com/office/powerpoint/2012/main"/>
+    </p:ext>
+  </p:extLst>
 </p:presentation>
 </file>
 
@@ -240,7 +249,7 @@
           </a:lstStyle>
           <a:p>
             <a:r>
-              <a:rPr lang="en-US" smtClean="0"/>
+              <a:rPr lang="en-US"/>
               <a:t>Click to edit Master title style</a:t>
             </a:r>
             <a:endParaRPr lang="en-US" dirty="0"/>
@@ -312,7 +321,7 @@
           </a:lstStyle>
           <a:p>
             <a:r>
-              <a:rPr lang="en-US" smtClean="0"/>
+              <a:rPr lang="en-US"/>
               <a:t>Click to edit Master subtitle style</a:t>
             </a:r>
             <a:endParaRPr lang="en-US" dirty="0"/>
@@ -336,7 +345,7 @@
           <a:p>
             <a:fld id="{96DFF08F-DC6B-4601-B491-B0F83F6DD2DA}" type="datetimeFigureOut">
               <a:rPr lang="en-US" dirty="0"/>
-              <a:t>11/22/2017</a:t>
+              <a:t>12/12/2017</a:t>
             </a:fld>
             <a:endParaRPr lang="en-US" dirty="0"/>
           </a:p>
@@ -463,7 +472,7 @@
           <a:lstStyle/>
           <a:p>
             <a:r>
-              <a:rPr lang="en-US" smtClean="0"/>
+              <a:rPr lang="en-US"/>
               <a:t>Click to edit Master title style</a:t>
             </a:r>
             <a:endParaRPr lang="en-US" dirty="0"/>
@@ -487,35 +496,35 @@
           <a:p>
             <a:pPr lvl="0"/>
             <a:r>
-              <a:rPr lang="en-US" smtClean="0"/>
+              <a:rPr lang="en-US"/>
               <a:t>Click to edit Master text styles</a:t>
             </a:r>
           </a:p>
           <a:p>
             <a:pPr lvl="1"/>
             <a:r>
-              <a:rPr lang="en-US" smtClean="0"/>
+              <a:rPr lang="en-US"/>
               <a:t>Second level</a:t>
             </a:r>
           </a:p>
           <a:p>
             <a:pPr lvl="2"/>
             <a:r>
-              <a:rPr lang="en-US" smtClean="0"/>
+              <a:rPr lang="en-US"/>
               <a:t>Third level</a:t>
             </a:r>
           </a:p>
           <a:p>
             <a:pPr lvl="3"/>
             <a:r>
-              <a:rPr lang="en-US" smtClean="0"/>
+              <a:rPr lang="en-US"/>
               <a:t>Fourth level</a:t>
             </a:r>
           </a:p>
           <a:p>
             <a:pPr lvl="4"/>
             <a:r>
-              <a:rPr lang="en-US" smtClean="0"/>
+              <a:rPr lang="en-US"/>
               <a:t>Fifth level</a:t>
             </a:r>
             <a:endParaRPr lang="en-US" dirty="0"/>
@@ -539,7 +548,7 @@
           <a:p>
             <a:fld id="{96DFF08F-DC6B-4601-B491-B0F83F6DD2DA}" type="datetimeFigureOut">
               <a:rPr lang="en-US" dirty="0"/>
-              <a:t>11/22/2017</a:t>
+              <a:t>12/12/2017</a:t>
             </a:fld>
             <a:endParaRPr lang="en-US" dirty="0"/>
           </a:p>
@@ -709,7 +718,7 @@
           <a:lstStyle/>
           <a:p>
             <a:r>
-              <a:rPr lang="en-US" smtClean="0"/>
+              <a:rPr lang="en-US"/>
               <a:t>Click to edit Master title style</a:t>
             </a:r>
             <a:endParaRPr lang="en-US" dirty="0"/>
@@ -738,35 +747,35 @@
           <a:p>
             <a:pPr lvl="0"/>
             <a:r>
-              <a:rPr lang="en-US" smtClean="0"/>
+              <a:rPr lang="en-US"/>
               <a:t>Click to edit Master text styles</a:t>
             </a:r>
           </a:p>
           <a:p>
             <a:pPr lvl="1"/>
             <a:r>
-              <a:rPr lang="en-US" smtClean="0"/>
+              <a:rPr lang="en-US"/>
               <a:t>Second level</a:t>
             </a:r>
           </a:p>
           <a:p>
             <a:pPr lvl="2"/>
             <a:r>
-              <a:rPr lang="en-US" smtClean="0"/>
+              <a:rPr lang="en-US"/>
               <a:t>Third level</a:t>
             </a:r>
           </a:p>
           <a:p>
             <a:pPr lvl="3"/>
             <a:r>
-              <a:rPr lang="en-US" smtClean="0"/>
+              <a:rPr lang="en-US"/>
               <a:t>Fourth level</a:t>
             </a:r>
           </a:p>
           <a:p>
             <a:pPr lvl="4"/>
             <a:r>
-              <a:rPr lang="en-US" smtClean="0"/>
+              <a:rPr lang="en-US"/>
               <a:t>Fifth level</a:t>
             </a:r>
             <a:endParaRPr lang="en-US" dirty="0"/>
@@ -790,7 +799,7 @@
           <a:p>
             <a:fld id="{96DFF08F-DC6B-4601-B491-B0F83F6DD2DA}" type="datetimeFigureOut">
               <a:rPr lang="en-US" dirty="0"/>
-              <a:t>11/22/2017</a:t>
+              <a:t>12/12/2017</a:t>
             </a:fld>
             <a:endParaRPr lang="en-US" dirty="0"/>
           </a:p>
@@ -879,7 +888,7 @@
           <a:lstStyle/>
           <a:p>
             <a:r>
-              <a:rPr lang="en-US" smtClean="0"/>
+              <a:rPr lang="en-US"/>
               <a:t>Click to edit Master title style</a:t>
             </a:r>
             <a:endParaRPr lang="en-US" dirty="0"/>
@@ -903,35 +912,35 @@
           <a:p>
             <a:pPr lvl="0"/>
             <a:r>
-              <a:rPr lang="en-US" smtClean="0"/>
+              <a:rPr lang="en-US"/>
               <a:t>Click to edit Master text styles</a:t>
             </a:r>
           </a:p>
           <a:p>
             <a:pPr lvl="1"/>
             <a:r>
-              <a:rPr lang="en-US" smtClean="0"/>
+              <a:rPr lang="en-US"/>
               <a:t>Second level</a:t>
             </a:r>
           </a:p>
           <a:p>
             <a:pPr lvl="2"/>
             <a:r>
-              <a:rPr lang="en-US" smtClean="0"/>
+              <a:rPr lang="en-US"/>
               <a:t>Third level</a:t>
             </a:r>
           </a:p>
           <a:p>
             <a:pPr lvl="3"/>
             <a:r>
-              <a:rPr lang="en-US" smtClean="0"/>
+              <a:rPr lang="en-US"/>
               <a:t>Fourth level</a:t>
             </a:r>
           </a:p>
           <a:p>
             <a:pPr lvl="4"/>
             <a:r>
-              <a:rPr lang="en-US" smtClean="0"/>
+              <a:rPr lang="en-US"/>
               <a:t>Fifth level</a:t>
             </a:r>
             <a:endParaRPr lang="en-US" dirty="0"/>
@@ -955,7 +964,7 @@
           <a:p>
             <a:fld id="{D62CEF3B-A037-46D0-B02C-1428F07E9383}" type="datetimeFigureOut">
               <a:rPr lang="en-US" dirty="0"/>
-              <a:t>11/22/2017</a:t>
+              <a:t>12/12/2017</a:t>
             </a:fld>
             <a:endParaRPr lang="en-US" dirty="0"/>
           </a:p>
@@ -1149,7 +1158,7 @@
           </a:lstStyle>
           <a:p>
             <a:r>
-              <a:rPr lang="en-US" smtClean="0"/>
+              <a:rPr lang="en-US"/>
               <a:t>Click to edit Master title style</a:t>
             </a:r>
             <a:endParaRPr lang="en-US" dirty="0"/>
@@ -1270,7 +1279,7 @@
           <a:p>
             <a:pPr lvl="0"/>
             <a:r>
-              <a:rPr lang="en-US" smtClean="0"/>
+              <a:rPr lang="en-US"/>
               <a:t>Click to edit Master text styles</a:t>
             </a:r>
           </a:p>
@@ -1293,7 +1302,7 @@
           <a:p>
             <a:fld id="{96DFF08F-DC6B-4601-B491-B0F83F6DD2DA}" type="datetimeFigureOut">
               <a:rPr lang="en-US" dirty="0"/>
-              <a:t>11/22/2017</a:t>
+              <a:t>12/12/2017</a:t>
             </a:fld>
             <a:endParaRPr lang="en-US" dirty="0"/>
           </a:p>
@@ -1425,7 +1434,7 @@
           <a:lstStyle/>
           <a:p>
             <a:r>
-              <a:rPr lang="en-US" smtClean="0"/>
+              <a:rPr lang="en-US"/>
               <a:t>Click to edit Master title style</a:t>
             </a:r>
             <a:endParaRPr lang="en-US" dirty="0"/>
@@ -1454,35 +1463,35 @@
           <a:p>
             <a:pPr lvl="0"/>
             <a:r>
-              <a:rPr lang="en-US" smtClean="0"/>
+              <a:rPr lang="en-US"/>
               <a:t>Click to edit Master text styles</a:t>
             </a:r>
           </a:p>
           <a:p>
             <a:pPr lvl="1"/>
             <a:r>
-              <a:rPr lang="en-US" smtClean="0"/>
+              <a:rPr lang="en-US"/>
               <a:t>Second level</a:t>
             </a:r>
           </a:p>
           <a:p>
             <a:pPr lvl="2"/>
             <a:r>
-              <a:rPr lang="en-US" smtClean="0"/>
+              <a:rPr lang="en-US"/>
               <a:t>Third level</a:t>
             </a:r>
           </a:p>
           <a:p>
             <a:pPr lvl="3"/>
             <a:r>
-              <a:rPr lang="en-US" smtClean="0"/>
+              <a:rPr lang="en-US"/>
               <a:t>Fourth level</a:t>
             </a:r>
           </a:p>
           <a:p>
             <a:pPr lvl="4"/>
             <a:r>
-              <a:rPr lang="en-US" smtClean="0"/>
+              <a:rPr lang="en-US"/>
               <a:t>Fifth level</a:t>
             </a:r>
             <a:endParaRPr lang="en-US" dirty="0"/>
@@ -1511,35 +1520,35 @@
           <a:p>
             <a:pPr lvl="0"/>
             <a:r>
-              <a:rPr lang="en-US" smtClean="0"/>
+              <a:rPr lang="en-US"/>
               <a:t>Click to edit Master text styles</a:t>
             </a:r>
           </a:p>
           <a:p>
             <a:pPr lvl="1"/>
             <a:r>
-              <a:rPr lang="en-US" smtClean="0"/>
+              <a:rPr lang="en-US"/>
               <a:t>Second level</a:t>
             </a:r>
           </a:p>
           <a:p>
             <a:pPr lvl="2"/>
             <a:r>
-              <a:rPr lang="en-US" smtClean="0"/>
+              <a:rPr lang="en-US"/>
               <a:t>Third level</a:t>
             </a:r>
           </a:p>
           <a:p>
             <a:pPr lvl="3"/>
             <a:r>
-              <a:rPr lang="en-US" smtClean="0"/>
+              <a:rPr lang="en-US"/>
               <a:t>Fourth level</a:t>
             </a:r>
           </a:p>
           <a:p>
             <a:pPr lvl="4"/>
             <a:r>
-              <a:rPr lang="en-US" smtClean="0"/>
+              <a:rPr lang="en-US"/>
               <a:t>Fifth level</a:t>
             </a:r>
             <a:endParaRPr lang="en-US" dirty="0"/>
@@ -1563,7 +1572,7 @@
           <a:p>
             <a:fld id="{96DFF08F-DC6B-4601-B491-B0F83F6DD2DA}" type="datetimeFigureOut">
               <a:rPr lang="en-US" dirty="0"/>
-              <a:t>11/22/2017</a:t>
+              <a:t>12/12/2017</a:t>
             </a:fld>
             <a:endParaRPr lang="en-US" dirty="0"/>
           </a:p>
@@ -1657,7 +1666,7 @@
           <a:lstStyle/>
           <a:p>
             <a:r>
-              <a:rPr lang="en-US" smtClean="0"/>
+              <a:rPr lang="en-US"/>
               <a:t>Click to edit Master title style</a:t>
             </a:r>
             <a:endParaRPr lang="en-US" dirty="0"/>
@@ -1729,7 +1738,7 @@
           <a:p>
             <a:pPr lvl="0"/>
             <a:r>
-              <a:rPr lang="en-US" smtClean="0"/>
+              <a:rPr lang="en-US"/>
               <a:t>Click to edit Master text styles</a:t>
             </a:r>
           </a:p>
@@ -1757,35 +1766,35 @@
           <a:p>
             <a:pPr lvl="0"/>
             <a:r>
-              <a:rPr lang="en-US" smtClean="0"/>
+              <a:rPr lang="en-US"/>
               <a:t>Click to edit Master text styles</a:t>
             </a:r>
           </a:p>
           <a:p>
             <a:pPr lvl="1"/>
             <a:r>
-              <a:rPr lang="en-US" smtClean="0"/>
+              <a:rPr lang="en-US"/>
               <a:t>Second level</a:t>
             </a:r>
           </a:p>
           <a:p>
             <a:pPr lvl="2"/>
             <a:r>
-              <a:rPr lang="en-US" smtClean="0"/>
+              <a:rPr lang="en-US"/>
               <a:t>Third level</a:t>
             </a:r>
           </a:p>
           <a:p>
             <a:pPr lvl="3"/>
             <a:r>
-              <a:rPr lang="en-US" smtClean="0"/>
+              <a:rPr lang="en-US"/>
               <a:t>Fourth level</a:t>
             </a:r>
           </a:p>
           <a:p>
             <a:pPr lvl="4"/>
             <a:r>
-              <a:rPr lang="en-US" smtClean="0"/>
+              <a:rPr lang="en-US"/>
               <a:t>Fifth level</a:t>
             </a:r>
             <a:endParaRPr lang="en-US" dirty="0"/>
@@ -1857,7 +1866,7 @@
           <a:p>
             <a:pPr lvl="0"/>
             <a:r>
-              <a:rPr lang="en-US" smtClean="0"/>
+              <a:rPr lang="en-US"/>
               <a:t>Click to edit Master text styles</a:t>
             </a:r>
           </a:p>
@@ -1885,35 +1894,35 @@
           <a:p>
             <a:pPr lvl="0"/>
             <a:r>
-              <a:rPr lang="en-US" smtClean="0"/>
+              <a:rPr lang="en-US"/>
               <a:t>Click to edit Master text styles</a:t>
             </a:r>
           </a:p>
           <a:p>
             <a:pPr lvl="1"/>
             <a:r>
-              <a:rPr lang="en-US" smtClean="0"/>
+              <a:rPr lang="en-US"/>
               <a:t>Second level</a:t>
             </a:r>
           </a:p>
           <a:p>
             <a:pPr lvl="2"/>
             <a:r>
-              <a:rPr lang="en-US" smtClean="0"/>
+              <a:rPr lang="en-US"/>
               <a:t>Third level</a:t>
             </a:r>
           </a:p>
           <a:p>
             <a:pPr lvl="3"/>
             <a:r>
-              <a:rPr lang="en-US" smtClean="0"/>
+              <a:rPr lang="en-US"/>
               <a:t>Fourth level</a:t>
             </a:r>
           </a:p>
           <a:p>
             <a:pPr lvl="4"/>
             <a:r>
-              <a:rPr lang="en-US" smtClean="0"/>
+              <a:rPr lang="en-US"/>
               <a:t>Fifth level</a:t>
             </a:r>
             <a:endParaRPr lang="en-US" dirty="0"/>
@@ -1937,7 +1946,7 @@
           <a:p>
             <a:fld id="{96DFF08F-DC6B-4601-B491-B0F83F6DD2DA}" type="datetimeFigureOut">
               <a:rPr lang="en-US" dirty="0"/>
-              <a:t>11/22/2017</a:t>
+              <a:t>12/12/2017</a:t>
             </a:fld>
             <a:endParaRPr lang="en-US" dirty="0"/>
           </a:p>
@@ -2026,7 +2035,7 @@
           <a:lstStyle/>
           <a:p>
             <a:r>
-              <a:rPr lang="en-US" smtClean="0"/>
+              <a:rPr lang="en-US"/>
               <a:t>Click to edit Master title style</a:t>
             </a:r>
             <a:endParaRPr lang="en-US" dirty="0"/>
@@ -2050,7 +2059,7 @@
           <a:p>
             <a:fld id="{96DFF08F-DC6B-4601-B491-B0F83F6DD2DA}" type="datetimeFigureOut">
               <a:rPr lang="en-US" dirty="0"/>
-              <a:t>11/22/2017</a:t>
+              <a:t>12/12/2017</a:t>
             </a:fld>
             <a:endParaRPr lang="en-US" dirty="0"/>
           </a:p>
@@ -2217,7 +2226,7 @@
             <a:fld id="{96DFF08F-DC6B-4601-B491-B0F83F6DD2DA}" type="datetimeFigureOut">
               <a:rPr lang="en-US" dirty="0"/>
               <a:pPr/>
-              <a:t>11/22/2017</a:t>
+              <a:t>12/12/2017</a:t>
             </a:fld>
             <a:endParaRPr lang="en-US" dirty="0"/>
           </a:p>
@@ -2406,7 +2415,7 @@
           </a:lstStyle>
           <a:p>
             <a:r>
-              <a:rPr lang="en-US" smtClean="0"/>
+              <a:rPr lang="en-US"/>
               <a:t>Click to edit Master title style</a:t>
             </a:r>
             <a:endParaRPr lang="en-US" dirty="0"/>
@@ -2435,35 +2444,35 @@
           <a:p>
             <a:pPr lvl="0"/>
             <a:r>
-              <a:rPr lang="en-US" smtClean="0"/>
+              <a:rPr lang="en-US"/>
               <a:t>Click to edit Master text styles</a:t>
             </a:r>
           </a:p>
           <a:p>
             <a:pPr lvl="1"/>
             <a:r>
-              <a:rPr lang="en-US" smtClean="0"/>
+              <a:rPr lang="en-US"/>
               <a:t>Second level</a:t>
             </a:r>
           </a:p>
           <a:p>
             <a:pPr lvl="2"/>
             <a:r>
-              <a:rPr lang="en-US" smtClean="0"/>
+              <a:rPr lang="en-US"/>
               <a:t>Third level</a:t>
             </a:r>
           </a:p>
           <a:p>
             <a:pPr lvl="3"/>
             <a:r>
-              <a:rPr lang="en-US" smtClean="0"/>
+              <a:rPr lang="en-US"/>
               <a:t>Fourth level</a:t>
             </a:r>
           </a:p>
           <a:p>
             <a:pPr lvl="4"/>
             <a:r>
-              <a:rPr lang="en-US" smtClean="0"/>
+              <a:rPr lang="en-US"/>
               <a:t>Fifth level</a:t>
             </a:r>
             <a:endParaRPr lang="en-US" dirty="0"/>
@@ -2535,7 +2544,7 @@
           <a:p>
             <a:pPr lvl="0"/>
             <a:r>
-              <a:rPr lang="en-US" smtClean="0"/>
+              <a:rPr lang="en-US"/>
               <a:t>Click to edit Master text styles</a:t>
             </a:r>
           </a:p>
@@ -2568,7 +2577,7 @@
             <a:fld id="{96DFF08F-DC6B-4601-B491-B0F83F6DD2DA}" type="datetimeFigureOut">
               <a:rPr lang="en-US" dirty="0"/>
               <a:pPr/>
-              <a:t>11/22/2017</a:t>
+              <a:t>12/12/2017</a:t>
             </a:fld>
             <a:endParaRPr lang="en-US" dirty="0"/>
           </a:p>
@@ -2770,7 +2779,7 @@
           </a:lstStyle>
           <a:p>
             <a:r>
-              <a:rPr lang="en-US" smtClean="0"/>
+              <a:rPr lang="en-US"/>
               <a:t>Click to edit Master title style</a:t>
             </a:r>
             <a:endParaRPr lang="en-US" dirty="0"/>
@@ -2840,7 +2849,7 @@
           </a:lstStyle>
           <a:p>
             <a:r>
-              <a:rPr lang="en-US" smtClean="0"/>
+              <a:rPr lang="en-US"/>
               <a:t>Click icon to add picture</a:t>
             </a:r>
             <a:endParaRPr lang="en-US" dirty="0"/>
@@ -2918,7 +2927,7 @@
           <a:p>
             <a:pPr lvl="0"/>
             <a:r>
-              <a:rPr lang="en-US" smtClean="0"/>
+              <a:rPr lang="en-US"/>
               <a:t>Click to edit Master text styles</a:t>
             </a:r>
           </a:p>
@@ -2941,7 +2950,7 @@
           <a:p>
             <a:fld id="{96DFF08F-DC6B-4601-B491-B0F83F6DD2DA}" type="datetimeFigureOut">
               <a:rPr lang="en-US" dirty="0"/>
-              <a:t>11/22/2017</a:t>
+              <a:t>12/12/2017</a:t>
             </a:fld>
             <a:endParaRPr lang="en-US" dirty="0"/>
           </a:p>
@@ -3121,7 +3130,7 @@
           <a:lstStyle/>
           <a:p>
             <a:r>
-              <a:rPr lang="en-US" smtClean="0"/>
+              <a:rPr lang="en-US"/>
               <a:t>Click to edit Master title style</a:t>
             </a:r>
             <a:endParaRPr lang="en-US" dirty="0"/>
@@ -3155,35 +3164,35 @@
           <a:p>
             <a:pPr lvl="0"/>
             <a:r>
-              <a:rPr lang="en-US" smtClean="0"/>
+              <a:rPr lang="en-US"/>
               <a:t>Click to edit Master text styles</a:t>
             </a:r>
           </a:p>
           <a:p>
             <a:pPr lvl="1"/>
             <a:r>
-              <a:rPr lang="en-US" smtClean="0"/>
+              <a:rPr lang="en-US"/>
               <a:t>Second level</a:t>
             </a:r>
           </a:p>
           <a:p>
             <a:pPr lvl="2"/>
             <a:r>
-              <a:rPr lang="en-US" smtClean="0"/>
+              <a:rPr lang="en-US"/>
               <a:t>Third level</a:t>
             </a:r>
           </a:p>
           <a:p>
             <a:pPr lvl="3"/>
             <a:r>
-              <a:rPr lang="en-US" smtClean="0"/>
+              <a:rPr lang="en-US"/>
               <a:t>Fourth level</a:t>
             </a:r>
           </a:p>
           <a:p>
             <a:pPr lvl="4"/>
             <a:r>
-              <a:rPr lang="en-US" smtClean="0"/>
+              <a:rPr lang="en-US"/>
               <a:t>Fifth level</a:t>
             </a:r>
             <a:endParaRPr lang="en-US" dirty="0"/>
@@ -3224,7 +3233,7 @@
             <a:fld id="{96DFF08F-DC6B-4601-B491-B0F83F6DD2DA}" type="datetimeFigureOut">
               <a:rPr lang="en-US" dirty="0"/>
               <a:pPr/>
-              <a:t>11/22/2017</a:t>
+              <a:t>12/12/2017</a:t>
             </a:fld>
             <a:endParaRPr lang="en-US" dirty="0"/>
           </a:p>
@@ -3760,7 +3769,7 @@
           <a:lstStyle/>
           <a:p>
             <a:r>
-              <a:rPr lang="pt-BR" dirty="0" smtClean="0"/>
+              <a:rPr lang="pt-BR" dirty="0"/>
               <a:t>DMAIC</a:t>
             </a:r>
             <a:endParaRPr lang="en-US" dirty="0"/>
@@ -3783,11 +3792,11 @@
           <a:lstStyle/>
           <a:p>
             <a:r>
-              <a:rPr lang="pt-BR" dirty="0" smtClean="0"/>
+              <a:rPr lang="pt-BR" dirty="0"/>
               <a:t>FASE IMPROVE - </a:t>
             </a:r>
             <a:r>
-              <a:rPr lang="pt-BR" b="1" dirty="0" smtClean="0"/>
+              <a:rPr lang="pt-BR" b="1" dirty="0"/>
               <a:t>MELHORAR</a:t>
             </a:r>
             <a:endParaRPr lang="en-US" b="1" dirty="0"/>
@@ -4013,10 +4022,122 @@
           <a:lstStyle/>
           <a:p>
             <a:r>
-              <a:rPr lang="pt-BR" dirty="0" smtClean="0"/>
+              <a:rPr lang="pt-BR" dirty="0"/>
               <a:t>DMAIC – Revisão sobre a fase IMPROVE</a:t>
             </a:r>
             <a:endParaRPr lang="en-US" dirty="0"/>
+          </a:p>
+        </p:txBody>
+      </p:sp>
+      <p:sp>
+        <p:nvSpPr>
+          <p:cNvPr id="3" name="TextBox 2">
+            <a:extLst>
+              <a:ext uri="{FF2B5EF4-FFF2-40B4-BE49-F238E27FC236}">
+                <a16:creationId xmlns:a16="http://schemas.microsoft.com/office/drawing/2014/main" id="{15A2FCD7-AC8B-4279-9C0C-0EB5A026C1B6}"/>
+              </a:ext>
+            </a:extLst>
+          </p:cNvPr>
+          <p:cNvSpPr txBox="1"/>
+          <p:nvPr/>
+        </p:nvSpPr>
+        <p:spPr>
+          <a:xfrm>
+            <a:off x="357809" y="2173357"/>
+            <a:ext cx="10797871" cy="707886"/>
+          </a:xfrm>
+          <a:prstGeom prst="rect">
+            <a:avLst/>
+          </a:prstGeom>
+          <a:noFill/>
+        </p:spPr>
+        <p:txBody>
+          <a:bodyPr wrap="square" rtlCol="0">
+            <a:spAutoFit/>
+          </a:bodyPr>
+          <a:lstStyle/>
+          <a:p>
+            <a:r>
+              <a:rPr lang="en-GB" sz="2000" dirty="0" err="1"/>
+              <a:t>Discutir</a:t>
+            </a:r>
+            <a:r>
+              <a:rPr lang="en-GB" sz="2000" dirty="0"/>
+              <a:t> -&gt; </a:t>
+            </a:r>
+            <a:r>
+              <a:rPr lang="en-GB" sz="2000" dirty="0" err="1"/>
+              <a:t>Gerar</a:t>
+            </a:r>
+            <a:r>
+              <a:rPr lang="en-GB" sz="2000" dirty="0"/>
+              <a:t> </a:t>
+            </a:r>
+            <a:r>
+              <a:rPr lang="en-GB" sz="2000" dirty="0" err="1"/>
+              <a:t>Soluções</a:t>
+            </a:r>
+            <a:r>
+              <a:rPr lang="en-GB" sz="2000" dirty="0"/>
+              <a:t> -&gt; </a:t>
+            </a:r>
+            <a:r>
+              <a:rPr lang="en-GB" sz="2000" dirty="0" err="1"/>
+              <a:t>Priorizar</a:t>
+            </a:r>
+            <a:r>
+              <a:rPr lang="en-GB" sz="2000" dirty="0"/>
+              <a:t> -&gt; </a:t>
+            </a:r>
+            <a:r>
+              <a:rPr lang="en-GB" sz="2000" dirty="0" err="1"/>
+              <a:t>Analisar</a:t>
+            </a:r>
+            <a:r>
+              <a:rPr lang="en-GB" sz="2000" dirty="0"/>
+              <a:t> </a:t>
+            </a:r>
+            <a:r>
+              <a:rPr lang="en-GB" sz="2000" dirty="0" err="1"/>
+              <a:t>Riscos</a:t>
+            </a:r>
+            <a:r>
+              <a:rPr lang="en-GB" sz="2000" dirty="0"/>
+              <a:t>  -&gt; </a:t>
+            </a:r>
+            <a:r>
+              <a:rPr lang="en-GB" sz="2000" dirty="0" err="1"/>
+              <a:t>Testar</a:t>
+            </a:r>
+            <a:r>
+              <a:rPr lang="en-GB" sz="2000" dirty="0"/>
+              <a:t> -&gt; </a:t>
+            </a:r>
+            <a:r>
+              <a:rPr lang="en-GB" sz="2000" dirty="0" err="1"/>
+              <a:t>Provar</a:t>
+            </a:r>
+            <a:r>
+              <a:rPr lang="en-GB" sz="2000" dirty="0"/>
+              <a:t> o </a:t>
+            </a:r>
+            <a:r>
+              <a:rPr lang="en-GB" sz="2000" dirty="0" err="1"/>
+              <a:t>atingimento</a:t>
+            </a:r>
+            <a:r>
+              <a:rPr lang="en-GB" sz="2000" dirty="0"/>
+              <a:t> da meta com </a:t>
+            </a:r>
+            <a:r>
+              <a:rPr lang="en-GB" sz="2000" dirty="0" err="1"/>
+              <a:t>os</a:t>
+            </a:r>
+            <a:r>
+              <a:rPr lang="en-GB" sz="2000" dirty="0"/>
+              <a:t> testes</a:t>
+            </a:r>
+            <a:endParaRPr lang="pt-BR" sz="2000" dirty="0"/>
           </a:p>
         </p:txBody>
       </p:sp>
@@ -4030,13 +4151,6 @@
   <p:clrMapOvr>
     <a:masterClrMapping/>
   </p:clrMapOvr>
-  <p:timing>
-    <p:tnLst>
-      <p:par>
-        <p:cTn id="1" dur="indefinite" restart="never" nodeType="tmRoot"/>
-      </p:par>
-    </p:tnLst>
-  </p:timing>
 </p:sld>
 </file>
 
@@ -4358,7 +4472,11 @@
           <a:bodyPr/>
           <a:lstStyle/>
           <a:p>
-            <a:endParaRPr lang="en-US"/>
+            <a:r>
+              <a:rPr lang="en-US" dirty="0" err="1"/>
+              <a:t>Perguntas</a:t>
+            </a:r>
+            <a:endParaRPr lang="en-US" dirty="0"/>
           </a:p>
         </p:txBody>
       </p:sp>
@@ -4377,10 +4495,3279 @@
           <a:bodyPr/>
           <a:lstStyle/>
           <a:p>
-            <a:endParaRPr lang="en-US"/>
+            <a:r>
+              <a:rPr lang="en-US" dirty="0" err="1"/>
+              <a:t>Quais</a:t>
+            </a:r>
+            <a:r>
+              <a:rPr lang="en-US" dirty="0"/>
+              <a:t> as </a:t>
+            </a:r>
+            <a:r>
+              <a:rPr lang="en-US" dirty="0" err="1"/>
+              <a:t>possíveis</a:t>
+            </a:r>
+            <a:r>
+              <a:rPr lang="en-US" dirty="0"/>
+              <a:t> </a:t>
+            </a:r>
+            <a:r>
+              <a:rPr lang="en-US" dirty="0" err="1"/>
+              <a:t>Soluções</a:t>
+            </a:r>
+            <a:r>
+              <a:rPr lang="en-US" dirty="0"/>
+              <a:t>?</a:t>
+            </a:r>
+          </a:p>
+          <a:p>
+            <a:endParaRPr lang="en-US" dirty="0"/>
+          </a:p>
+          <a:p>
+            <a:endParaRPr lang="en-US" dirty="0"/>
+          </a:p>
+          <a:p>
+            <a:endParaRPr lang="en-US" dirty="0"/>
           </a:p>
         </p:txBody>
       </p:sp>
+      <p:graphicFrame>
+        <p:nvGraphicFramePr>
+          <p:cNvPr id="6" name="Table 5">
+            <a:extLst>
+              <a:ext uri="{FF2B5EF4-FFF2-40B4-BE49-F238E27FC236}">
+                <a16:creationId xmlns:a16="http://schemas.microsoft.com/office/drawing/2014/main" id="{F6106EAD-A4AB-47C6-B080-5B62508AB7FD}"/>
+              </a:ext>
+            </a:extLst>
+          </p:cNvPr>
+          <p:cNvGraphicFramePr>
+            <a:graphicFrameLocks noGrp="1"/>
+          </p:cNvGraphicFramePr>
+          <p:nvPr>
+            <p:extLst>
+              <p:ext uri="{D42A27DB-BD31-4B8C-83A1-F6EECF244321}">
+                <p14:modId xmlns:p14="http://schemas.microsoft.com/office/powerpoint/2010/main" val="2903768130"/>
+              </p:ext>
+            </p:extLst>
+          </p:nvPr>
+        </p:nvGraphicFramePr>
+        <p:xfrm>
+          <a:off x="715617" y="2235201"/>
+          <a:ext cx="11476389" cy="3520681"/>
+        </p:xfrm>
+        <a:graphic>
+          <a:graphicData uri="http://schemas.openxmlformats.org/drawingml/2006/table">
+            <a:tbl>
+              <a:tblPr/>
+              <a:tblGrid>
+                <a:gridCol w="3551758">
+                  <a:extLst>
+                    <a:ext uri="{9D8B030D-6E8A-4147-A177-3AD203B41FA5}">
+                      <a16:colId xmlns:a16="http://schemas.microsoft.com/office/drawing/2014/main" val="1333101523"/>
+                    </a:ext>
+                  </a:extLst>
+                </a:gridCol>
+                <a:gridCol w="591960">
+                  <a:extLst>
+                    <a:ext uri="{9D8B030D-6E8A-4147-A177-3AD203B41FA5}">
+                      <a16:colId xmlns:a16="http://schemas.microsoft.com/office/drawing/2014/main" val="4057561418"/>
+                    </a:ext>
+                  </a:extLst>
+                </a:gridCol>
+                <a:gridCol w="591960">
+                  <a:extLst>
+                    <a:ext uri="{9D8B030D-6E8A-4147-A177-3AD203B41FA5}">
+                      <a16:colId xmlns:a16="http://schemas.microsoft.com/office/drawing/2014/main" val="3418571863"/>
+                    </a:ext>
+                  </a:extLst>
+                </a:gridCol>
+                <a:gridCol w="591960">
+                  <a:extLst>
+                    <a:ext uri="{9D8B030D-6E8A-4147-A177-3AD203B41FA5}">
+                      <a16:colId xmlns:a16="http://schemas.microsoft.com/office/drawing/2014/main" val="565312714"/>
+                    </a:ext>
+                  </a:extLst>
+                </a:gridCol>
+                <a:gridCol w="591960">
+                  <a:extLst>
+                    <a:ext uri="{9D8B030D-6E8A-4147-A177-3AD203B41FA5}">
+                      <a16:colId xmlns:a16="http://schemas.microsoft.com/office/drawing/2014/main" val="3209090606"/>
+                    </a:ext>
+                  </a:extLst>
+                </a:gridCol>
+                <a:gridCol w="591960">
+                  <a:extLst>
+                    <a:ext uri="{9D8B030D-6E8A-4147-A177-3AD203B41FA5}">
+                      <a16:colId xmlns:a16="http://schemas.microsoft.com/office/drawing/2014/main" val="1654921750"/>
+                    </a:ext>
+                  </a:extLst>
+                </a:gridCol>
+                <a:gridCol w="591960">
+                  <a:extLst>
+                    <a:ext uri="{9D8B030D-6E8A-4147-A177-3AD203B41FA5}">
+                      <a16:colId xmlns:a16="http://schemas.microsoft.com/office/drawing/2014/main" val="351230077"/>
+                    </a:ext>
+                  </a:extLst>
+                </a:gridCol>
+                <a:gridCol w="591960">
+                  <a:extLst>
+                    <a:ext uri="{9D8B030D-6E8A-4147-A177-3AD203B41FA5}">
+                      <a16:colId xmlns:a16="http://schemas.microsoft.com/office/drawing/2014/main" val="3764478555"/>
+                    </a:ext>
+                  </a:extLst>
+                </a:gridCol>
+                <a:gridCol w="190955">
+                  <a:extLst>
+                    <a:ext uri="{9D8B030D-6E8A-4147-A177-3AD203B41FA5}">
+                      <a16:colId xmlns:a16="http://schemas.microsoft.com/office/drawing/2014/main" val="2783755739"/>
+                    </a:ext>
+                  </a:extLst>
+                </a:gridCol>
+                <a:gridCol w="598326">
+                  <a:extLst>
+                    <a:ext uri="{9D8B030D-6E8A-4147-A177-3AD203B41FA5}">
+                      <a16:colId xmlns:a16="http://schemas.microsoft.com/office/drawing/2014/main" val="3606925959"/>
+                    </a:ext>
+                  </a:extLst>
+                </a:gridCol>
+                <a:gridCol w="598326">
+                  <a:extLst>
+                    <a:ext uri="{9D8B030D-6E8A-4147-A177-3AD203B41FA5}">
+                      <a16:colId xmlns:a16="http://schemas.microsoft.com/office/drawing/2014/main" val="390708543"/>
+                    </a:ext>
+                  </a:extLst>
+                </a:gridCol>
+                <a:gridCol w="598326">
+                  <a:extLst>
+                    <a:ext uri="{9D8B030D-6E8A-4147-A177-3AD203B41FA5}">
+                      <a16:colId xmlns:a16="http://schemas.microsoft.com/office/drawing/2014/main" val="2940058566"/>
+                    </a:ext>
+                  </a:extLst>
+                </a:gridCol>
+                <a:gridCol w="598326">
+                  <a:extLst>
+                    <a:ext uri="{9D8B030D-6E8A-4147-A177-3AD203B41FA5}">
+                      <a16:colId xmlns:a16="http://schemas.microsoft.com/office/drawing/2014/main" val="2356789548"/>
+                    </a:ext>
+                  </a:extLst>
+                </a:gridCol>
+                <a:gridCol w="598326">
+                  <a:extLst>
+                    <a:ext uri="{9D8B030D-6E8A-4147-A177-3AD203B41FA5}">
+                      <a16:colId xmlns:a16="http://schemas.microsoft.com/office/drawing/2014/main" val="551625646"/>
+                    </a:ext>
+                  </a:extLst>
+                </a:gridCol>
+                <a:gridCol w="598326">
+                  <a:extLst>
+                    <a:ext uri="{9D8B030D-6E8A-4147-A177-3AD203B41FA5}">
+                      <a16:colId xmlns:a16="http://schemas.microsoft.com/office/drawing/2014/main" val="1291258616"/>
+                    </a:ext>
+                  </a:extLst>
+                </a:gridCol>
+              </a:tblGrid>
+              <a:tr h="573975">
+                <a:tc gridSpan="9">
+                  <a:txBody>
+                    <a:bodyPr/>
+                    <a:lstStyle/>
+                    <a:p>
+                      <a:pPr algn="l" fontAlgn="b"/>
+                      <a:r>
+                        <a:rPr lang="pt-BR" sz="1200" b="0" i="0" u="none" strike="noStrike" dirty="0">
+                          <a:solidFill>
+                            <a:srgbClr val="000000"/>
+                          </a:solidFill>
+                          <a:effectLst/>
+                          <a:latin typeface="Calibri" panose="020F0502020204030204" pitchFamily="34" charset="0"/>
+                        </a:rPr>
+                        <a:t>Padronização de Códigos para inserção de Comentários evitando baixo rastreamento dos retornos dos PADS (por exemplo: para ciencia, para correção, ...)</a:t>
+                      </a:r>
+                    </a:p>
+                  </a:txBody>
+                  <a:tcPr marL="0" marR="0" marT="0" marB="0" anchor="b">
+                    <a:lnL>
+                      <a:noFill/>
+                    </a:lnL>
+                    <a:lnR>
+                      <a:noFill/>
+                    </a:lnR>
+                    <a:lnT>
+                      <a:noFill/>
+                    </a:lnT>
+                    <a:lnB>
+                      <a:noFill/>
+                    </a:lnB>
+                    <a:solidFill>
+                      <a:srgbClr val="F2F2F2"/>
+                    </a:solidFill>
+                  </a:tcPr>
+                </a:tc>
+                <a:tc hMerge="1">
+                  <a:txBody>
+                    <a:bodyPr/>
+                    <a:lstStyle/>
+                    <a:p>
+                      <a:endParaRPr lang="pt-BR"/>
+                    </a:p>
+                  </a:txBody>
+                  <a:tcPr/>
+                </a:tc>
+                <a:tc hMerge="1">
+                  <a:txBody>
+                    <a:bodyPr/>
+                    <a:lstStyle/>
+                    <a:p>
+                      <a:endParaRPr lang="pt-BR"/>
+                    </a:p>
+                  </a:txBody>
+                  <a:tcPr/>
+                </a:tc>
+                <a:tc hMerge="1">
+                  <a:txBody>
+                    <a:bodyPr/>
+                    <a:lstStyle/>
+                    <a:p>
+                      <a:endParaRPr lang="pt-BR"/>
+                    </a:p>
+                  </a:txBody>
+                  <a:tcPr/>
+                </a:tc>
+                <a:tc hMerge="1">
+                  <a:txBody>
+                    <a:bodyPr/>
+                    <a:lstStyle/>
+                    <a:p>
+                      <a:endParaRPr lang="pt-BR"/>
+                    </a:p>
+                  </a:txBody>
+                  <a:tcPr/>
+                </a:tc>
+                <a:tc hMerge="1">
+                  <a:txBody>
+                    <a:bodyPr/>
+                    <a:lstStyle/>
+                    <a:p>
+                      <a:endParaRPr lang="pt-BR"/>
+                    </a:p>
+                  </a:txBody>
+                  <a:tcPr/>
+                </a:tc>
+                <a:tc hMerge="1">
+                  <a:txBody>
+                    <a:bodyPr/>
+                    <a:lstStyle/>
+                    <a:p>
+                      <a:endParaRPr lang="pt-BR"/>
+                    </a:p>
+                  </a:txBody>
+                  <a:tcPr/>
+                </a:tc>
+                <a:tc hMerge="1">
+                  <a:txBody>
+                    <a:bodyPr/>
+                    <a:lstStyle/>
+                    <a:p>
+                      <a:endParaRPr lang="pt-BR"/>
+                    </a:p>
+                  </a:txBody>
+                  <a:tcPr/>
+                </a:tc>
+                <a:tc hMerge="1">
+                  <a:txBody>
+                    <a:bodyPr/>
+                    <a:lstStyle/>
+                    <a:p>
+                      <a:endParaRPr lang="pt-BR"/>
+                    </a:p>
+                  </a:txBody>
+                  <a:tcPr/>
+                </a:tc>
+                <a:tc>
+                  <a:txBody>
+                    <a:bodyPr/>
+                    <a:lstStyle/>
+                    <a:p>
+                      <a:pPr algn="l" fontAlgn="b"/>
+                      <a:endParaRPr lang="pt-BR" sz="1200" b="0" i="0" u="none" strike="noStrike">
+                        <a:solidFill>
+                          <a:srgbClr val="000000"/>
+                        </a:solidFill>
+                        <a:effectLst/>
+                        <a:latin typeface="Calibri" panose="020F0502020204030204" pitchFamily="34" charset="0"/>
+                      </a:endParaRPr>
+                    </a:p>
+                  </a:txBody>
+                  <a:tcPr marL="0" marR="0" marT="0" marB="0" anchor="b">
+                    <a:lnL>
+                      <a:noFill/>
+                    </a:lnL>
+                    <a:lnR>
+                      <a:noFill/>
+                    </a:lnR>
+                    <a:lnT>
+                      <a:noFill/>
+                    </a:lnT>
+                    <a:lnB>
+                      <a:noFill/>
+                    </a:lnB>
+                  </a:tcPr>
+                </a:tc>
+                <a:tc>
+                  <a:txBody>
+                    <a:bodyPr/>
+                    <a:lstStyle/>
+                    <a:p>
+                      <a:pPr algn="l" fontAlgn="b"/>
+                      <a:endParaRPr lang="pt-BR" sz="1200" b="0" i="0" u="none" strike="noStrike">
+                        <a:solidFill>
+                          <a:srgbClr val="000000"/>
+                        </a:solidFill>
+                        <a:effectLst/>
+                        <a:latin typeface="Calibri" panose="020F0502020204030204" pitchFamily="34" charset="0"/>
+                      </a:endParaRPr>
+                    </a:p>
+                  </a:txBody>
+                  <a:tcPr marL="0" marR="0" marT="0" marB="0" anchor="b">
+                    <a:lnL>
+                      <a:noFill/>
+                    </a:lnL>
+                    <a:lnR>
+                      <a:noFill/>
+                    </a:lnR>
+                    <a:lnT>
+                      <a:noFill/>
+                    </a:lnT>
+                    <a:lnB>
+                      <a:noFill/>
+                    </a:lnB>
+                  </a:tcPr>
+                </a:tc>
+                <a:tc>
+                  <a:txBody>
+                    <a:bodyPr/>
+                    <a:lstStyle/>
+                    <a:p>
+                      <a:pPr algn="l" fontAlgn="b"/>
+                      <a:endParaRPr lang="pt-BR" sz="1200" b="0" i="0" u="none" strike="noStrike">
+                        <a:solidFill>
+                          <a:srgbClr val="000000"/>
+                        </a:solidFill>
+                        <a:effectLst/>
+                        <a:latin typeface="Calibri" panose="020F0502020204030204" pitchFamily="34" charset="0"/>
+                      </a:endParaRPr>
+                    </a:p>
+                  </a:txBody>
+                  <a:tcPr marL="0" marR="0" marT="0" marB="0" anchor="b">
+                    <a:lnL>
+                      <a:noFill/>
+                    </a:lnL>
+                    <a:lnR>
+                      <a:noFill/>
+                    </a:lnR>
+                    <a:lnT>
+                      <a:noFill/>
+                    </a:lnT>
+                    <a:lnB>
+                      <a:noFill/>
+                    </a:lnB>
+                  </a:tcPr>
+                </a:tc>
+                <a:tc>
+                  <a:txBody>
+                    <a:bodyPr/>
+                    <a:lstStyle/>
+                    <a:p>
+                      <a:pPr algn="l" fontAlgn="b"/>
+                      <a:endParaRPr lang="pt-BR" sz="1200" b="0" i="0" u="none" strike="noStrike">
+                        <a:solidFill>
+                          <a:srgbClr val="000000"/>
+                        </a:solidFill>
+                        <a:effectLst/>
+                        <a:latin typeface="Calibri" panose="020F0502020204030204" pitchFamily="34" charset="0"/>
+                      </a:endParaRPr>
+                    </a:p>
+                  </a:txBody>
+                  <a:tcPr marL="0" marR="0" marT="0" marB="0" anchor="b">
+                    <a:lnL>
+                      <a:noFill/>
+                    </a:lnL>
+                    <a:lnR>
+                      <a:noFill/>
+                    </a:lnR>
+                    <a:lnT>
+                      <a:noFill/>
+                    </a:lnT>
+                    <a:lnB>
+                      <a:noFill/>
+                    </a:lnB>
+                  </a:tcPr>
+                </a:tc>
+                <a:tc>
+                  <a:txBody>
+                    <a:bodyPr/>
+                    <a:lstStyle/>
+                    <a:p>
+                      <a:pPr algn="l" fontAlgn="b"/>
+                      <a:endParaRPr lang="pt-BR" sz="1200" b="0" i="0" u="none" strike="noStrike">
+                        <a:solidFill>
+                          <a:srgbClr val="000000"/>
+                        </a:solidFill>
+                        <a:effectLst/>
+                        <a:latin typeface="Calibri" panose="020F0502020204030204" pitchFamily="34" charset="0"/>
+                      </a:endParaRPr>
+                    </a:p>
+                  </a:txBody>
+                  <a:tcPr marL="0" marR="0" marT="0" marB="0" anchor="b">
+                    <a:lnL>
+                      <a:noFill/>
+                    </a:lnL>
+                    <a:lnR>
+                      <a:noFill/>
+                    </a:lnR>
+                    <a:lnT>
+                      <a:noFill/>
+                    </a:lnT>
+                    <a:lnB>
+                      <a:noFill/>
+                    </a:lnB>
+                  </a:tcPr>
+                </a:tc>
+                <a:tc>
+                  <a:txBody>
+                    <a:bodyPr/>
+                    <a:lstStyle/>
+                    <a:p>
+                      <a:pPr algn="l" fontAlgn="b"/>
+                      <a:endParaRPr lang="pt-BR" sz="1200" b="0" i="0" u="none" strike="noStrike">
+                        <a:solidFill>
+                          <a:srgbClr val="000000"/>
+                        </a:solidFill>
+                        <a:effectLst/>
+                        <a:latin typeface="Calibri" panose="020F0502020204030204" pitchFamily="34" charset="0"/>
+                      </a:endParaRPr>
+                    </a:p>
+                  </a:txBody>
+                  <a:tcPr marL="0" marR="0" marT="0" marB="0" anchor="b">
+                    <a:lnL>
+                      <a:noFill/>
+                    </a:lnL>
+                    <a:lnR>
+                      <a:noFill/>
+                    </a:lnR>
+                    <a:lnT>
+                      <a:noFill/>
+                    </a:lnT>
+                    <a:lnB>
+                      <a:noFill/>
+                    </a:lnB>
+                  </a:tcPr>
+                </a:tc>
+                <a:extLst>
+                  <a:ext uri="{0D108BD9-81ED-4DB2-BD59-A6C34878D82A}">
+                    <a16:rowId xmlns:a16="http://schemas.microsoft.com/office/drawing/2014/main" val="1447387580"/>
+                  </a:ext>
+                </a:extLst>
+              </a:tr>
+              <a:tr h="312905">
+                <a:tc>
+                  <a:txBody>
+                    <a:bodyPr/>
+                    <a:lstStyle/>
+                    <a:p>
+                      <a:pPr algn="l" fontAlgn="b"/>
+                      <a:r>
+                        <a:rPr lang="pt-BR" sz="1200" b="0" i="0" u="none" strike="noStrike" dirty="0">
+                          <a:solidFill>
+                            <a:srgbClr val="000000"/>
+                          </a:solidFill>
+                          <a:effectLst/>
+                          <a:latin typeface="Calibri" panose="020F0502020204030204" pitchFamily="34" charset="0"/>
+                        </a:rPr>
+                        <a:t>Versionamento de Documentos para evitar duplicidades</a:t>
+                      </a:r>
+                    </a:p>
+                  </a:txBody>
+                  <a:tcPr marL="0" marR="0" marT="0" marB="0" anchor="b">
+                    <a:lnL>
+                      <a:noFill/>
+                    </a:lnL>
+                    <a:lnR>
+                      <a:noFill/>
+                    </a:lnR>
+                    <a:lnT>
+                      <a:noFill/>
+                    </a:lnT>
+                    <a:lnB>
+                      <a:noFill/>
+                    </a:lnB>
+                    <a:solidFill>
+                      <a:srgbClr val="F2F2F2"/>
+                    </a:solidFill>
+                  </a:tcPr>
+                </a:tc>
+                <a:tc>
+                  <a:txBody>
+                    <a:bodyPr/>
+                    <a:lstStyle/>
+                    <a:p>
+                      <a:pPr algn="l" fontAlgn="b"/>
+                      <a:r>
+                        <a:rPr lang="pt-BR" sz="1200" b="0" i="0" u="none" strike="noStrike">
+                          <a:solidFill>
+                            <a:srgbClr val="404040"/>
+                          </a:solidFill>
+                          <a:effectLst/>
+                          <a:latin typeface="Calibri" panose="020F0502020204030204" pitchFamily="34" charset="0"/>
+                        </a:rPr>
+                        <a:t> </a:t>
+                      </a:r>
+                    </a:p>
+                  </a:txBody>
+                  <a:tcPr marL="0" marR="0" marT="0" marB="0" anchor="b">
+                    <a:lnL>
+                      <a:noFill/>
+                    </a:lnL>
+                    <a:lnR>
+                      <a:noFill/>
+                    </a:lnR>
+                    <a:lnT>
+                      <a:noFill/>
+                    </a:lnT>
+                    <a:lnB>
+                      <a:noFill/>
+                    </a:lnB>
+                    <a:solidFill>
+                      <a:srgbClr val="F2F2F2"/>
+                    </a:solidFill>
+                  </a:tcPr>
+                </a:tc>
+                <a:tc>
+                  <a:txBody>
+                    <a:bodyPr/>
+                    <a:lstStyle/>
+                    <a:p>
+                      <a:pPr algn="l" fontAlgn="b"/>
+                      <a:r>
+                        <a:rPr lang="pt-BR" sz="1200" b="0" i="0" u="none" strike="noStrike">
+                          <a:solidFill>
+                            <a:srgbClr val="404040"/>
+                          </a:solidFill>
+                          <a:effectLst/>
+                          <a:latin typeface="Calibri" panose="020F0502020204030204" pitchFamily="34" charset="0"/>
+                        </a:rPr>
+                        <a:t> </a:t>
+                      </a:r>
+                    </a:p>
+                  </a:txBody>
+                  <a:tcPr marL="0" marR="0" marT="0" marB="0" anchor="b">
+                    <a:lnL>
+                      <a:noFill/>
+                    </a:lnL>
+                    <a:lnR>
+                      <a:noFill/>
+                    </a:lnR>
+                    <a:lnT>
+                      <a:noFill/>
+                    </a:lnT>
+                    <a:lnB>
+                      <a:noFill/>
+                    </a:lnB>
+                    <a:solidFill>
+                      <a:srgbClr val="F2F2F2"/>
+                    </a:solidFill>
+                  </a:tcPr>
+                </a:tc>
+                <a:tc>
+                  <a:txBody>
+                    <a:bodyPr/>
+                    <a:lstStyle/>
+                    <a:p>
+                      <a:pPr algn="l" fontAlgn="b"/>
+                      <a:r>
+                        <a:rPr lang="pt-BR" sz="1200" b="0" i="0" u="none" strike="noStrike">
+                          <a:solidFill>
+                            <a:srgbClr val="404040"/>
+                          </a:solidFill>
+                          <a:effectLst/>
+                          <a:latin typeface="Calibri" panose="020F0502020204030204" pitchFamily="34" charset="0"/>
+                        </a:rPr>
+                        <a:t> </a:t>
+                      </a:r>
+                    </a:p>
+                  </a:txBody>
+                  <a:tcPr marL="0" marR="0" marT="0" marB="0" anchor="b">
+                    <a:lnL>
+                      <a:noFill/>
+                    </a:lnL>
+                    <a:lnR>
+                      <a:noFill/>
+                    </a:lnR>
+                    <a:lnT>
+                      <a:noFill/>
+                    </a:lnT>
+                    <a:lnB>
+                      <a:noFill/>
+                    </a:lnB>
+                    <a:solidFill>
+                      <a:srgbClr val="F2F2F2"/>
+                    </a:solidFill>
+                  </a:tcPr>
+                </a:tc>
+                <a:tc>
+                  <a:txBody>
+                    <a:bodyPr/>
+                    <a:lstStyle/>
+                    <a:p>
+                      <a:pPr algn="l" fontAlgn="b"/>
+                      <a:r>
+                        <a:rPr lang="pt-BR" sz="1200" b="0" i="0" u="none" strike="noStrike">
+                          <a:solidFill>
+                            <a:srgbClr val="404040"/>
+                          </a:solidFill>
+                          <a:effectLst/>
+                          <a:latin typeface="Calibri" panose="020F0502020204030204" pitchFamily="34" charset="0"/>
+                        </a:rPr>
+                        <a:t> </a:t>
+                      </a:r>
+                    </a:p>
+                  </a:txBody>
+                  <a:tcPr marL="0" marR="0" marT="0" marB="0" anchor="b">
+                    <a:lnL>
+                      <a:noFill/>
+                    </a:lnL>
+                    <a:lnR>
+                      <a:noFill/>
+                    </a:lnR>
+                    <a:lnT>
+                      <a:noFill/>
+                    </a:lnT>
+                    <a:lnB>
+                      <a:noFill/>
+                    </a:lnB>
+                    <a:solidFill>
+                      <a:srgbClr val="F2F2F2"/>
+                    </a:solidFill>
+                  </a:tcPr>
+                </a:tc>
+                <a:tc>
+                  <a:txBody>
+                    <a:bodyPr/>
+                    <a:lstStyle/>
+                    <a:p>
+                      <a:pPr algn="l" fontAlgn="b"/>
+                      <a:r>
+                        <a:rPr lang="pt-BR" sz="1200" b="0" i="0" u="none" strike="noStrike">
+                          <a:solidFill>
+                            <a:srgbClr val="404040"/>
+                          </a:solidFill>
+                          <a:effectLst/>
+                          <a:latin typeface="Calibri" panose="020F0502020204030204" pitchFamily="34" charset="0"/>
+                        </a:rPr>
+                        <a:t> </a:t>
+                      </a:r>
+                    </a:p>
+                  </a:txBody>
+                  <a:tcPr marL="0" marR="0" marT="0" marB="0" anchor="b">
+                    <a:lnL>
+                      <a:noFill/>
+                    </a:lnL>
+                    <a:lnR>
+                      <a:noFill/>
+                    </a:lnR>
+                    <a:lnT>
+                      <a:noFill/>
+                    </a:lnT>
+                    <a:lnB>
+                      <a:noFill/>
+                    </a:lnB>
+                    <a:solidFill>
+                      <a:srgbClr val="F2F2F2"/>
+                    </a:solidFill>
+                  </a:tcPr>
+                </a:tc>
+                <a:tc>
+                  <a:txBody>
+                    <a:bodyPr/>
+                    <a:lstStyle/>
+                    <a:p>
+                      <a:pPr algn="l" fontAlgn="b"/>
+                      <a:r>
+                        <a:rPr lang="pt-BR" sz="1200" b="0" i="0" u="none" strike="noStrike">
+                          <a:solidFill>
+                            <a:srgbClr val="404040"/>
+                          </a:solidFill>
+                          <a:effectLst/>
+                          <a:latin typeface="Calibri" panose="020F0502020204030204" pitchFamily="34" charset="0"/>
+                        </a:rPr>
+                        <a:t> </a:t>
+                      </a:r>
+                    </a:p>
+                  </a:txBody>
+                  <a:tcPr marL="0" marR="0" marT="0" marB="0" anchor="b">
+                    <a:lnL>
+                      <a:noFill/>
+                    </a:lnL>
+                    <a:lnR>
+                      <a:noFill/>
+                    </a:lnR>
+                    <a:lnT>
+                      <a:noFill/>
+                    </a:lnT>
+                    <a:lnB>
+                      <a:noFill/>
+                    </a:lnB>
+                    <a:solidFill>
+                      <a:srgbClr val="F2F2F2"/>
+                    </a:solidFill>
+                  </a:tcPr>
+                </a:tc>
+                <a:tc>
+                  <a:txBody>
+                    <a:bodyPr/>
+                    <a:lstStyle/>
+                    <a:p>
+                      <a:pPr algn="l" fontAlgn="b"/>
+                      <a:r>
+                        <a:rPr lang="pt-BR" sz="1200" b="0" i="0" u="none" strike="noStrike">
+                          <a:solidFill>
+                            <a:srgbClr val="404040"/>
+                          </a:solidFill>
+                          <a:effectLst/>
+                          <a:latin typeface="Calibri" panose="020F0502020204030204" pitchFamily="34" charset="0"/>
+                        </a:rPr>
+                        <a:t> </a:t>
+                      </a:r>
+                    </a:p>
+                  </a:txBody>
+                  <a:tcPr marL="0" marR="0" marT="0" marB="0" anchor="b">
+                    <a:lnL>
+                      <a:noFill/>
+                    </a:lnL>
+                    <a:lnR>
+                      <a:noFill/>
+                    </a:lnR>
+                    <a:lnT>
+                      <a:noFill/>
+                    </a:lnT>
+                    <a:lnB>
+                      <a:noFill/>
+                    </a:lnB>
+                    <a:solidFill>
+                      <a:srgbClr val="F2F2F2"/>
+                    </a:solidFill>
+                  </a:tcPr>
+                </a:tc>
+                <a:tc>
+                  <a:txBody>
+                    <a:bodyPr/>
+                    <a:lstStyle/>
+                    <a:p>
+                      <a:pPr algn="l" fontAlgn="b"/>
+                      <a:r>
+                        <a:rPr lang="pt-BR" sz="1200" b="0" i="0" u="none" strike="noStrike">
+                          <a:solidFill>
+                            <a:srgbClr val="000000"/>
+                          </a:solidFill>
+                          <a:effectLst/>
+                          <a:latin typeface="Calibri" panose="020F0502020204030204" pitchFamily="34" charset="0"/>
+                        </a:rPr>
+                        <a:t> </a:t>
+                      </a:r>
+                    </a:p>
+                  </a:txBody>
+                  <a:tcPr marL="0" marR="0" marT="0" marB="0" anchor="b">
+                    <a:lnL>
+                      <a:noFill/>
+                    </a:lnL>
+                    <a:lnR>
+                      <a:noFill/>
+                    </a:lnR>
+                    <a:lnT>
+                      <a:noFill/>
+                    </a:lnT>
+                    <a:lnB>
+                      <a:noFill/>
+                    </a:lnB>
+                    <a:solidFill>
+                      <a:srgbClr val="F2F2F2"/>
+                    </a:solidFill>
+                  </a:tcPr>
+                </a:tc>
+                <a:tc>
+                  <a:txBody>
+                    <a:bodyPr/>
+                    <a:lstStyle/>
+                    <a:p>
+                      <a:pPr algn="l" fontAlgn="b"/>
+                      <a:endParaRPr lang="pt-BR" sz="1200" b="0" i="0" u="none" strike="noStrike">
+                        <a:solidFill>
+                          <a:srgbClr val="000000"/>
+                        </a:solidFill>
+                        <a:effectLst/>
+                        <a:latin typeface="Calibri" panose="020F0502020204030204" pitchFamily="34" charset="0"/>
+                      </a:endParaRPr>
+                    </a:p>
+                  </a:txBody>
+                  <a:tcPr marL="0" marR="0" marT="0" marB="0" anchor="b">
+                    <a:lnL>
+                      <a:noFill/>
+                    </a:lnL>
+                    <a:lnR>
+                      <a:noFill/>
+                    </a:lnR>
+                    <a:lnT>
+                      <a:noFill/>
+                    </a:lnT>
+                    <a:lnB>
+                      <a:noFill/>
+                    </a:lnB>
+                  </a:tcPr>
+                </a:tc>
+                <a:tc>
+                  <a:txBody>
+                    <a:bodyPr/>
+                    <a:lstStyle/>
+                    <a:p>
+                      <a:pPr algn="l" fontAlgn="b"/>
+                      <a:endParaRPr lang="pt-BR" sz="1200" b="0" i="0" u="none" strike="noStrike">
+                        <a:solidFill>
+                          <a:srgbClr val="000000"/>
+                        </a:solidFill>
+                        <a:effectLst/>
+                        <a:latin typeface="Calibri" panose="020F0502020204030204" pitchFamily="34" charset="0"/>
+                      </a:endParaRPr>
+                    </a:p>
+                  </a:txBody>
+                  <a:tcPr marL="0" marR="0" marT="0" marB="0" anchor="b">
+                    <a:lnL>
+                      <a:noFill/>
+                    </a:lnL>
+                    <a:lnR>
+                      <a:noFill/>
+                    </a:lnR>
+                    <a:lnT>
+                      <a:noFill/>
+                    </a:lnT>
+                    <a:lnB>
+                      <a:noFill/>
+                    </a:lnB>
+                  </a:tcPr>
+                </a:tc>
+                <a:tc>
+                  <a:txBody>
+                    <a:bodyPr/>
+                    <a:lstStyle/>
+                    <a:p>
+                      <a:pPr algn="l" fontAlgn="b"/>
+                      <a:endParaRPr lang="pt-BR" sz="1200" b="0" i="0" u="none" strike="noStrike">
+                        <a:solidFill>
+                          <a:srgbClr val="000000"/>
+                        </a:solidFill>
+                        <a:effectLst/>
+                        <a:latin typeface="Calibri" panose="020F0502020204030204" pitchFamily="34" charset="0"/>
+                      </a:endParaRPr>
+                    </a:p>
+                  </a:txBody>
+                  <a:tcPr marL="0" marR="0" marT="0" marB="0" anchor="b">
+                    <a:lnL>
+                      <a:noFill/>
+                    </a:lnL>
+                    <a:lnR>
+                      <a:noFill/>
+                    </a:lnR>
+                    <a:lnT>
+                      <a:noFill/>
+                    </a:lnT>
+                    <a:lnB>
+                      <a:noFill/>
+                    </a:lnB>
+                  </a:tcPr>
+                </a:tc>
+                <a:tc>
+                  <a:txBody>
+                    <a:bodyPr/>
+                    <a:lstStyle/>
+                    <a:p>
+                      <a:pPr algn="l" fontAlgn="b"/>
+                      <a:endParaRPr lang="pt-BR" sz="1200" b="0" i="0" u="none" strike="noStrike">
+                        <a:solidFill>
+                          <a:srgbClr val="000000"/>
+                        </a:solidFill>
+                        <a:effectLst/>
+                        <a:latin typeface="Calibri" panose="020F0502020204030204" pitchFamily="34" charset="0"/>
+                      </a:endParaRPr>
+                    </a:p>
+                  </a:txBody>
+                  <a:tcPr marL="0" marR="0" marT="0" marB="0" anchor="b">
+                    <a:lnL>
+                      <a:noFill/>
+                    </a:lnL>
+                    <a:lnR>
+                      <a:noFill/>
+                    </a:lnR>
+                    <a:lnT>
+                      <a:noFill/>
+                    </a:lnT>
+                    <a:lnB>
+                      <a:noFill/>
+                    </a:lnB>
+                  </a:tcPr>
+                </a:tc>
+                <a:tc>
+                  <a:txBody>
+                    <a:bodyPr/>
+                    <a:lstStyle/>
+                    <a:p>
+                      <a:pPr algn="l" fontAlgn="b"/>
+                      <a:endParaRPr lang="pt-BR" sz="1200" b="0" i="0" u="none" strike="noStrike">
+                        <a:solidFill>
+                          <a:srgbClr val="000000"/>
+                        </a:solidFill>
+                        <a:effectLst/>
+                        <a:latin typeface="Calibri" panose="020F0502020204030204" pitchFamily="34" charset="0"/>
+                      </a:endParaRPr>
+                    </a:p>
+                  </a:txBody>
+                  <a:tcPr marL="0" marR="0" marT="0" marB="0" anchor="b">
+                    <a:lnL>
+                      <a:noFill/>
+                    </a:lnL>
+                    <a:lnR>
+                      <a:noFill/>
+                    </a:lnR>
+                    <a:lnT>
+                      <a:noFill/>
+                    </a:lnT>
+                    <a:lnB>
+                      <a:noFill/>
+                    </a:lnB>
+                  </a:tcPr>
+                </a:tc>
+                <a:tc>
+                  <a:txBody>
+                    <a:bodyPr/>
+                    <a:lstStyle/>
+                    <a:p>
+                      <a:pPr algn="l" fontAlgn="b"/>
+                      <a:endParaRPr lang="pt-BR" sz="1200" b="0" i="0" u="none" strike="noStrike">
+                        <a:solidFill>
+                          <a:srgbClr val="000000"/>
+                        </a:solidFill>
+                        <a:effectLst/>
+                        <a:latin typeface="Calibri" panose="020F0502020204030204" pitchFamily="34" charset="0"/>
+                      </a:endParaRPr>
+                    </a:p>
+                  </a:txBody>
+                  <a:tcPr marL="0" marR="0" marT="0" marB="0" anchor="b">
+                    <a:lnL>
+                      <a:noFill/>
+                    </a:lnL>
+                    <a:lnR>
+                      <a:noFill/>
+                    </a:lnR>
+                    <a:lnT>
+                      <a:noFill/>
+                    </a:lnT>
+                    <a:lnB>
+                      <a:noFill/>
+                    </a:lnB>
+                  </a:tcPr>
+                </a:tc>
+                <a:extLst>
+                  <a:ext uri="{0D108BD9-81ED-4DB2-BD59-A6C34878D82A}">
+                    <a16:rowId xmlns:a16="http://schemas.microsoft.com/office/drawing/2014/main" val="535951868"/>
+                  </a:ext>
+                </a:extLst>
+              </a:tr>
+              <a:tr h="283881">
+                <a:tc gridSpan="2">
+                  <a:txBody>
+                    <a:bodyPr/>
+                    <a:lstStyle/>
+                    <a:p>
+                      <a:pPr algn="l" fontAlgn="b"/>
+                      <a:r>
+                        <a:rPr lang="pt-BR" sz="1200" b="0" i="0" u="none" strike="noStrike">
+                          <a:solidFill>
+                            <a:srgbClr val="000000"/>
+                          </a:solidFill>
+                          <a:effectLst/>
+                          <a:latin typeface="Calibri" panose="020F0502020204030204" pitchFamily="34" charset="0"/>
+                        </a:rPr>
+                        <a:t>Padronização da Inspeção com o fim de torna-la mais objetiva.</a:t>
+                      </a:r>
+                    </a:p>
+                  </a:txBody>
+                  <a:tcPr marL="0" marR="0" marT="0" marB="0" anchor="b">
+                    <a:lnL>
+                      <a:noFill/>
+                    </a:lnL>
+                    <a:lnR>
+                      <a:noFill/>
+                    </a:lnR>
+                    <a:lnT>
+                      <a:noFill/>
+                    </a:lnT>
+                    <a:lnB>
+                      <a:noFill/>
+                    </a:lnB>
+                    <a:solidFill>
+                      <a:srgbClr val="F2F2F2"/>
+                    </a:solidFill>
+                  </a:tcPr>
+                </a:tc>
+                <a:tc hMerge="1">
+                  <a:txBody>
+                    <a:bodyPr/>
+                    <a:lstStyle/>
+                    <a:p>
+                      <a:endParaRPr lang="pt-BR"/>
+                    </a:p>
+                  </a:txBody>
+                  <a:tcPr/>
+                </a:tc>
+                <a:tc>
+                  <a:txBody>
+                    <a:bodyPr/>
+                    <a:lstStyle/>
+                    <a:p>
+                      <a:pPr algn="l" fontAlgn="b"/>
+                      <a:r>
+                        <a:rPr lang="pt-BR" sz="1200" b="0" i="0" u="none" strike="noStrike">
+                          <a:solidFill>
+                            <a:srgbClr val="404040"/>
+                          </a:solidFill>
+                          <a:effectLst/>
+                          <a:latin typeface="Calibri" panose="020F0502020204030204" pitchFamily="34" charset="0"/>
+                        </a:rPr>
+                        <a:t> </a:t>
+                      </a:r>
+                    </a:p>
+                  </a:txBody>
+                  <a:tcPr marL="0" marR="0" marT="0" marB="0" anchor="b">
+                    <a:lnL>
+                      <a:noFill/>
+                    </a:lnL>
+                    <a:lnR>
+                      <a:noFill/>
+                    </a:lnR>
+                    <a:lnT>
+                      <a:noFill/>
+                    </a:lnT>
+                    <a:lnB>
+                      <a:noFill/>
+                    </a:lnB>
+                    <a:solidFill>
+                      <a:srgbClr val="F2F2F2"/>
+                    </a:solidFill>
+                  </a:tcPr>
+                </a:tc>
+                <a:tc>
+                  <a:txBody>
+                    <a:bodyPr/>
+                    <a:lstStyle/>
+                    <a:p>
+                      <a:pPr algn="l" fontAlgn="b"/>
+                      <a:r>
+                        <a:rPr lang="pt-BR" sz="1200" b="0" i="0" u="none" strike="noStrike">
+                          <a:solidFill>
+                            <a:srgbClr val="404040"/>
+                          </a:solidFill>
+                          <a:effectLst/>
+                          <a:latin typeface="Calibri" panose="020F0502020204030204" pitchFamily="34" charset="0"/>
+                        </a:rPr>
+                        <a:t> </a:t>
+                      </a:r>
+                    </a:p>
+                  </a:txBody>
+                  <a:tcPr marL="0" marR="0" marT="0" marB="0" anchor="b">
+                    <a:lnL>
+                      <a:noFill/>
+                    </a:lnL>
+                    <a:lnR>
+                      <a:noFill/>
+                    </a:lnR>
+                    <a:lnT>
+                      <a:noFill/>
+                    </a:lnT>
+                    <a:lnB>
+                      <a:noFill/>
+                    </a:lnB>
+                    <a:solidFill>
+                      <a:srgbClr val="F2F2F2"/>
+                    </a:solidFill>
+                  </a:tcPr>
+                </a:tc>
+                <a:tc>
+                  <a:txBody>
+                    <a:bodyPr/>
+                    <a:lstStyle/>
+                    <a:p>
+                      <a:pPr algn="l" fontAlgn="b"/>
+                      <a:r>
+                        <a:rPr lang="pt-BR" sz="1200" b="0" i="0" u="none" strike="noStrike">
+                          <a:solidFill>
+                            <a:srgbClr val="404040"/>
+                          </a:solidFill>
+                          <a:effectLst/>
+                          <a:latin typeface="Calibri" panose="020F0502020204030204" pitchFamily="34" charset="0"/>
+                        </a:rPr>
+                        <a:t> </a:t>
+                      </a:r>
+                    </a:p>
+                  </a:txBody>
+                  <a:tcPr marL="0" marR="0" marT="0" marB="0" anchor="b">
+                    <a:lnL>
+                      <a:noFill/>
+                    </a:lnL>
+                    <a:lnR>
+                      <a:noFill/>
+                    </a:lnR>
+                    <a:lnT>
+                      <a:noFill/>
+                    </a:lnT>
+                    <a:lnB>
+                      <a:noFill/>
+                    </a:lnB>
+                    <a:solidFill>
+                      <a:srgbClr val="F2F2F2"/>
+                    </a:solidFill>
+                  </a:tcPr>
+                </a:tc>
+                <a:tc>
+                  <a:txBody>
+                    <a:bodyPr/>
+                    <a:lstStyle/>
+                    <a:p>
+                      <a:pPr algn="l" fontAlgn="b"/>
+                      <a:r>
+                        <a:rPr lang="pt-BR" sz="1200" b="0" i="0" u="none" strike="noStrike">
+                          <a:solidFill>
+                            <a:srgbClr val="404040"/>
+                          </a:solidFill>
+                          <a:effectLst/>
+                          <a:latin typeface="Calibri" panose="020F0502020204030204" pitchFamily="34" charset="0"/>
+                        </a:rPr>
+                        <a:t> </a:t>
+                      </a:r>
+                    </a:p>
+                  </a:txBody>
+                  <a:tcPr marL="0" marR="0" marT="0" marB="0" anchor="b">
+                    <a:lnL>
+                      <a:noFill/>
+                    </a:lnL>
+                    <a:lnR>
+                      <a:noFill/>
+                    </a:lnR>
+                    <a:lnT>
+                      <a:noFill/>
+                    </a:lnT>
+                    <a:lnB>
+                      <a:noFill/>
+                    </a:lnB>
+                    <a:solidFill>
+                      <a:srgbClr val="F2F2F2"/>
+                    </a:solidFill>
+                  </a:tcPr>
+                </a:tc>
+                <a:tc>
+                  <a:txBody>
+                    <a:bodyPr/>
+                    <a:lstStyle/>
+                    <a:p>
+                      <a:pPr algn="l" fontAlgn="b"/>
+                      <a:r>
+                        <a:rPr lang="pt-BR" sz="1200" b="0" i="0" u="none" strike="noStrike">
+                          <a:solidFill>
+                            <a:srgbClr val="404040"/>
+                          </a:solidFill>
+                          <a:effectLst/>
+                          <a:latin typeface="Calibri" panose="020F0502020204030204" pitchFamily="34" charset="0"/>
+                        </a:rPr>
+                        <a:t> </a:t>
+                      </a:r>
+                    </a:p>
+                  </a:txBody>
+                  <a:tcPr marL="0" marR="0" marT="0" marB="0" anchor="b">
+                    <a:lnL>
+                      <a:noFill/>
+                    </a:lnL>
+                    <a:lnR>
+                      <a:noFill/>
+                    </a:lnR>
+                    <a:lnT>
+                      <a:noFill/>
+                    </a:lnT>
+                    <a:lnB>
+                      <a:noFill/>
+                    </a:lnB>
+                    <a:solidFill>
+                      <a:srgbClr val="F2F2F2"/>
+                    </a:solidFill>
+                  </a:tcPr>
+                </a:tc>
+                <a:tc>
+                  <a:txBody>
+                    <a:bodyPr/>
+                    <a:lstStyle/>
+                    <a:p>
+                      <a:pPr algn="l" fontAlgn="b"/>
+                      <a:r>
+                        <a:rPr lang="pt-BR" sz="1200" b="0" i="0" u="none" strike="noStrike">
+                          <a:solidFill>
+                            <a:srgbClr val="404040"/>
+                          </a:solidFill>
+                          <a:effectLst/>
+                          <a:latin typeface="Calibri" panose="020F0502020204030204" pitchFamily="34" charset="0"/>
+                        </a:rPr>
+                        <a:t> </a:t>
+                      </a:r>
+                    </a:p>
+                  </a:txBody>
+                  <a:tcPr marL="0" marR="0" marT="0" marB="0" anchor="b">
+                    <a:lnL>
+                      <a:noFill/>
+                    </a:lnL>
+                    <a:lnR>
+                      <a:noFill/>
+                    </a:lnR>
+                    <a:lnT>
+                      <a:noFill/>
+                    </a:lnT>
+                    <a:lnB>
+                      <a:noFill/>
+                    </a:lnB>
+                    <a:solidFill>
+                      <a:srgbClr val="F2F2F2"/>
+                    </a:solidFill>
+                  </a:tcPr>
+                </a:tc>
+                <a:tc>
+                  <a:txBody>
+                    <a:bodyPr/>
+                    <a:lstStyle/>
+                    <a:p>
+                      <a:pPr algn="l" fontAlgn="b"/>
+                      <a:r>
+                        <a:rPr lang="pt-BR" sz="1200" b="0" i="0" u="none" strike="noStrike">
+                          <a:solidFill>
+                            <a:srgbClr val="000000"/>
+                          </a:solidFill>
+                          <a:effectLst/>
+                          <a:latin typeface="Calibri" panose="020F0502020204030204" pitchFamily="34" charset="0"/>
+                        </a:rPr>
+                        <a:t> </a:t>
+                      </a:r>
+                    </a:p>
+                  </a:txBody>
+                  <a:tcPr marL="0" marR="0" marT="0" marB="0" anchor="b">
+                    <a:lnL>
+                      <a:noFill/>
+                    </a:lnL>
+                    <a:lnR>
+                      <a:noFill/>
+                    </a:lnR>
+                    <a:lnT>
+                      <a:noFill/>
+                    </a:lnT>
+                    <a:lnB>
+                      <a:noFill/>
+                    </a:lnB>
+                    <a:solidFill>
+                      <a:srgbClr val="F2F2F2"/>
+                    </a:solidFill>
+                  </a:tcPr>
+                </a:tc>
+                <a:tc>
+                  <a:txBody>
+                    <a:bodyPr/>
+                    <a:lstStyle/>
+                    <a:p>
+                      <a:pPr algn="l" fontAlgn="b"/>
+                      <a:endParaRPr lang="pt-BR" sz="1200" b="0" i="0" u="none" strike="noStrike">
+                        <a:solidFill>
+                          <a:srgbClr val="000000"/>
+                        </a:solidFill>
+                        <a:effectLst/>
+                        <a:latin typeface="Calibri" panose="020F0502020204030204" pitchFamily="34" charset="0"/>
+                      </a:endParaRPr>
+                    </a:p>
+                  </a:txBody>
+                  <a:tcPr marL="0" marR="0" marT="0" marB="0" anchor="b">
+                    <a:lnL>
+                      <a:noFill/>
+                    </a:lnL>
+                    <a:lnR>
+                      <a:noFill/>
+                    </a:lnR>
+                    <a:lnT>
+                      <a:noFill/>
+                    </a:lnT>
+                    <a:lnB>
+                      <a:noFill/>
+                    </a:lnB>
+                  </a:tcPr>
+                </a:tc>
+                <a:tc>
+                  <a:txBody>
+                    <a:bodyPr/>
+                    <a:lstStyle/>
+                    <a:p>
+                      <a:pPr algn="l" fontAlgn="b"/>
+                      <a:endParaRPr lang="pt-BR" sz="1200" b="0" i="0" u="none" strike="noStrike">
+                        <a:solidFill>
+                          <a:srgbClr val="000000"/>
+                        </a:solidFill>
+                        <a:effectLst/>
+                        <a:latin typeface="Calibri" panose="020F0502020204030204" pitchFamily="34" charset="0"/>
+                      </a:endParaRPr>
+                    </a:p>
+                  </a:txBody>
+                  <a:tcPr marL="0" marR="0" marT="0" marB="0" anchor="b">
+                    <a:lnL>
+                      <a:noFill/>
+                    </a:lnL>
+                    <a:lnR>
+                      <a:noFill/>
+                    </a:lnR>
+                    <a:lnT>
+                      <a:noFill/>
+                    </a:lnT>
+                    <a:lnB>
+                      <a:noFill/>
+                    </a:lnB>
+                  </a:tcPr>
+                </a:tc>
+                <a:tc>
+                  <a:txBody>
+                    <a:bodyPr/>
+                    <a:lstStyle/>
+                    <a:p>
+                      <a:pPr algn="l" fontAlgn="b"/>
+                      <a:endParaRPr lang="pt-BR" sz="1200" b="0" i="0" u="none" strike="noStrike">
+                        <a:solidFill>
+                          <a:srgbClr val="000000"/>
+                        </a:solidFill>
+                        <a:effectLst/>
+                        <a:latin typeface="Calibri" panose="020F0502020204030204" pitchFamily="34" charset="0"/>
+                      </a:endParaRPr>
+                    </a:p>
+                  </a:txBody>
+                  <a:tcPr marL="0" marR="0" marT="0" marB="0" anchor="b">
+                    <a:lnL>
+                      <a:noFill/>
+                    </a:lnL>
+                    <a:lnR>
+                      <a:noFill/>
+                    </a:lnR>
+                    <a:lnT>
+                      <a:noFill/>
+                    </a:lnT>
+                    <a:lnB>
+                      <a:noFill/>
+                    </a:lnB>
+                  </a:tcPr>
+                </a:tc>
+                <a:tc>
+                  <a:txBody>
+                    <a:bodyPr/>
+                    <a:lstStyle/>
+                    <a:p>
+                      <a:pPr algn="l" fontAlgn="b"/>
+                      <a:endParaRPr lang="pt-BR" sz="1200" b="0" i="0" u="none" strike="noStrike">
+                        <a:solidFill>
+                          <a:srgbClr val="000000"/>
+                        </a:solidFill>
+                        <a:effectLst/>
+                        <a:latin typeface="Calibri" panose="020F0502020204030204" pitchFamily="34" charset="0"/>
+                      </a:endParaRPr>
+                    </a:p>
+                  </a:txBody>
+                  <a:tcPr marL="0" marR="0" marT="0" marB="0" anchor="b">
+                    <a:lnL>
+                      <a:noFill/>
+                    </a:lnL>
+                    <a:lnR>
+                      <a:noFill/>
+                    </a:lnR>
+                    <a:lnT>
+                      <a:noFill/>
+                    </a:lnT>
+                    <a:lnB>
+                      <a:noFill/>
+                    </a:lnB>
+                  </a:tcPr>
+                </a:tc>
+                <a:tc>
+                  <a:txBody>
+                    <a:bodyPr/>
+                    <a:lstStyle/>
+                    <a:p>
+                      <a:pPr algn="l" fontAlgn="b"/>
+                      <a:endParaRPr lang="pt-BR" sz="1200" b="0" i="0" u="none" strike="noStrike">
+                        <a:solidFill>
+                          <a:srgbClr val="000000"/>
+                        </a:solidFill>
+                        <a:effectLst/>
+                        <a:latin typeface="Calibri" panose="020F0502020204030204" pitchFamily="34" charset="0"/>
+                      </a:endParaRPr>
+                    </a:p>
+                  </a:txBody>
+                  <a:tcPr marL="0" marR="0" marT="0" marB="0" anchor="b">
+                    <a:lnL>
+                      <a:noFill/>
+                    </a:lnL>
+                    <a:lnR>
+                      <a:noFill/>
+                    </a:lnR>
+                    <a:lnT>
+                      <a:noFill/>
+                    </a:lnT>
+                    <a:lnB>
+                      <a:noFill/>
+                    </a:lnB>
+                  </a:tcPr>
+                </a:tc>
+                <a:tc>
+                  <a:txBody>
+                    <a:bodyPr/>
+                    <a:lstStyle/>
+                    <a:p>
+                      <a:pPr algn="l" fontAlgn="b"/>
+                      <a:endParaRPr lang="pt-BR" sz="1200" b="0" i="0" u="none" strike="noStrike">
+                        <a:solidFill>
+                          <a:srgbClr val="000000"/>
+                        </a:solidFill>
+                        <a:effectLst/>
+                        <a:latin typeface="Calibri" panose="020F0502020204030204" pitchFamily="34" charset="0"/>
+                      </a:endParaRPr>
+                    </a:p>
+                  </a:txBody>
+                  <a:tcPr marL="0" marR="0" marT="0" marB="0" anchor="b">
+                    <a:lnL>
+                      <a:noFill/>
+                    </a:lnL>
+                    <a:lnR>
+                      <a:noFill/>
+                    </a:lnR>
+                    <a:lnT>
+                      <a:noFill/>
+                    </a:lnT>
+                    <a:lnB>
+                      <a:noFill/>
+                    </a:lnB>
+                  </a:tcPr>
+                </a:tc>
+                <a:extLst>
+                  <a:ext uri="{0D108BD9-81ED-4DB2-BD59-A6C34878D82A}">
+                    <a16:rowId xmlns:a16="http://schemas.microsoft.com/office/drawing/2014/main" val="486070738"/>
+                  </a:ext>
+                </a:extLst>
+              </a:tr>
+              <a:tr h="312905">
+                <a:tc gridSpan="5">
+                  <a:txBody>
+                    <a:bodyPr/>
+                    <a:lstStyle/>
+                    <a:p>
+                      <a:pPr algn="l" fontAlgn="b"/>
+                      <a:r>
+                        <a:rPr lang="pt-BR" sz="1200" b="0" i="0" u="none" strike="noStrike">
+                          <a:solidFill>
+                            <a:srgbClr val="000000"/>
+                          </a:solidFill>
+                          <a:effectLst/>
+                          <a:latin typeface="Calibri" panose="020F0502020204030204" pitchFamily="34" charset="0"/>
+                        </a:rPr>
+                        <a:t>Treinamentos sobre o que será inspecionado nos documentos e interessados sejam notificados</a:t>
+                      </a:r>
+                    </a:p>
+                  </a:txBody>
+                  <a:tcPr marL="0" marR="0" marT="0" marB="0" anchor="b">
+                    <a:lnL>
+                      <a:noFill/>
+                    </a:lnL>
+                    <a:lnR>
+                      <a:noFill/>
+                    </a:lnR>
+                    <a:lnT>
+                      <a:noFill/>
+                    </a:lnT>
+                    <a:lnB>
+                      <a:noFill/>
+                    </a:lnB>
+                    <a:solidFill>
+                      <a:srgbClr val="F2F2F2"/>
+                    </a:solidFill>
+                  </a:tcPr>
+                </a:tc>
+                <a:tc hMerge="1">
+                  <a:txBody>
+                    <a:bodyPr/>
+                    <a:lstStyle/>
+                    <a:p>
+                      <a:endParaRPr lang="pt-BR"/>
+                    </a:p>
+                  </a:txBody>
+                  <a:tcPr/>
+                </a:tc>
+                <a:tc hMerge="1">
+                  <a:txBody>
+                    <a:bodyPr/>
+                    <a:lstStyle/>
+                    <a:p>
+                      <a:endParaRPr lang="pt-BR"/>
+                    </a:p>
+                  </a:txBody>
+                  <a:tcPr/>
+                </a:tc>
+                <a:tc hMerge="1">
+                  <a:txBody>
+                    <a:bodyPr/>
+                    <a:lstStyle/>
+                    <a:p>
+                      <a:endParaRPr lang="pt-BR"/>
+                    </a:p>
+                  </a:txBody>
+                  <a:tcPr/>
+                </a:tc>
+                <a:tc hMerge="1">
+                  <a:txBody>
+                    <a:bodyPr/>
+                    <a:lstStyle/>
+                    <a:p>
+                      <a:endParaRPr lang="pt-BR"/>
+                    </a:p>
+                  </a:txBody>
+                  <a:tcPr/>
+                </a:tc>
+                <a:tc>
+                  <a:txBody>
+                    <a:bodyPr/>
+                    <a:lstStyle/>
+                    <a:p>
+                      <a:pPr algn="l" fontAlgn="b"/>
+                      <a:r>
+                        <a:rPr lang="pt-BR" sz="1200" b="0" i="0" u="none" strike="noStrike">
+                          <a:solidFill>
+                            <a:srgbClr val="404040"/>
+                          </a:solidFill>
+                          <a:effectLst/>
+                          <a:latin typeface="Calibri" panose="020F0502020204030204" pitchFamily="34" charset="0"/>
+                        </a:rPr>
+                        <a:t> </a:t>
+                      </a:r>
+                    </a:p>
+                  </a:txBody>
+                  <a:tcPr marL="0" marR="0" marT="0" marB="0" anchor="b">
+                    <a:lnL>
+                      <a:noFill/>
+                    </a:lnL>
+                    <a:lnR>
+                      <a:noFill/>
+                    </a:lnR>
+                    <a:lnT>
+                      <a:noFill/>
+                    </a:lnT>
+                    <a:lnB>
+                      <a:noFill/>
+                    </a:lnB>
+                    <a:solidFill>
+                      <a:srgbClr val="F2F2F2"/>
+                    </a:solidFill>
+                  </a:tcPr>
+                </a:tc>
+                <a:tc>
+                  <a:txBody>
+                    <a:bodyPr/>
+                    <a:lstStyle/>
+                    <a:p>
+                      <a:pPr algn="l" fontAlgn="b"/>
+                      <a:r>
+                        <a:rPr lang="pt-BR" sz="1200" b="0" i="0" u="none" strike="noStrike">
+                          <a:solidFill>
+                            <a:srgbClr val="404040"/>
+                          </a:solidFill>
+                          <a:effectLst/>
+                          <a:latin typeface="Calibri" panose="020F0502020204030204" pitchFamily="34" charset="0"/>
+                        </a:rPr>
+                        <a:t> </a:t>
+                      </a:r>
+                    </a:p>
+                  </a:txBody>
+                  <a:tcPr marL="0" marR="0" marT="0" marB="0" anchor="b">
+                    <a:lnL>
+                      <a:noFill/>
+                    </a:lnL>
+                    <a:lnR>
+                      <a:noFill/>
+                    </a:lnR>
+                    <a:lnT>
+                      <a:noFill/>
+                    </a:lnT>
+                    <a:lnB>
+                      <a:noFill/>
+                    </a:lnB>
+                    <a:solidFill>
+                      <a:srgbClr val="F2F2F2"/>
+                    </a:solidFill>
+                  </a:tcPr>
+                </a:tc>
+                <a:tc>
+                  <a:txBody>
+                    <a:bodyPr/>
+                    <a:lstStyle/>
+                    <a:p>
+                      <a:pPr algn="l" fontAlgn="b"/>
+                      <a:r>
+                        <a:rPr lang="pt-BR" sz="1200" b="0" i="0" u="none" strike="noStrike">
+                          <a:solidFill>
+                            <a:srgbClr val="404040"/>
+                          </a:solidFill>
+                          <a:effectLst/>
+                          <a:latin typeface="Calibri" panose="020F0502020204030204" pitchFamily="34" charset="0"/>
+                        </a:rPr>
+                        <a:t> </a:t>
+                      </a:r>
+                    </a:p>
+                  </a:txBody>
+                  <a:tcPr marL="0" marR="0" marT="0" marB="0" anchor="b">
+                    <a:lnL>
+                      <a:noFill/>
+                    </a:lnL>
+                    <a:lnR>
+                      <a:noFill/>
+                    </a:lnR>
+                    <a:lnT>
+                      <a:noFill/>
+                    </a:lnT>
+                    <a:lnB>
+                      <a:noFill/>
+                    </a:lnB>
+                    <a:solidFill>
+                      <a:srgbClr val="F2F2F2"/>
+                    </a:solidFill>
+                  </a:tcPr>
+                </a:tc>
+                <a:tc>
+                  <a:txBody>
+                    <a:bodyPr/>
+                    <a:lstStyle/>
+                    <a:p>
+                      <a:pPr algn="l" fontAlgn="b"/>
+                      <a:r>
+                        <a:rPr lang="pt-BR" sz="1200" b="0" i="0" u="none" strike="noStrike">
+                          <a:solidFill>
+                            <a:srgbClr val="000000"/>
+                          </a:solidFill>
+                          <a:effectLst/>
+                          <a:latin typeface="Calibri" panose="020F0502020204030204" pitchFamily="34" charset="0"/>
+                        </a:rPr>
+                        <a:t> </a:t>
+                      </a:r>
+                    </a:p>
+                  </a:txBody>
+                  <a:tcPr marL="0" marR="0" marT="0" marB="0" anchor="b">
+                    <a:lnL>
+                      <a:noFill/>
+                    </a:lnL>
+                    <a:lnR>
+                      <a:noFill/>
+                    </a:lnR>
+                    <a:lnT>
+                      <a:noFill/>
+                    </a:lnT>
+                    <a:lnB>
+                      <a:noFill/>
+                    </a:lnB>
+                    <a:solidFill>
+                      <a:srgbClr val="F2F2F2"/>
+                    </a:solidFill>
+                  </a:tcPr>
+                </a:tc>
+                <a:tc>
+                  <a:txBody>
+                    <a:bodyPr/>
+                    <a:lstStyle/>
+                    <a:p>
+                      <a:pPr algn="l" fontAlgn="b"/>
+                      <a:endParaRPr lang="pt-BR" sz="1200" b="0" i="0" u="none" strike="noStrike">
+                        <a:solidFill>
+                          <a:srgbClr val="000000"/>
+                        </a:solidFill>
+                        <a:effectLst/>
+                        <a:latin typeface="Calibri" panose="020F0502020204030204" pitchFamily="34" charset="0"/>
+                      </a:endParaRPr>
+                    </a:p>
+                  </a:txBody>
+                  <a:tcPr marL="0" marR="0" marT="0" marB="0" anchor="b">
+                    <a:lnL>
+                      <a:noFill/>
+                    </a:lnL>
+                    <a:lnR>
+                      <a:noFill/>
+                    </a:lnR>
+                    <a:lnT>
+                      <a:noFill/>
+                    </a:lnT>
+                    <a:lnB>
+                      <a:noFill/>
+                    </a:lnB>
+                  </a:tcPr>
+                </a:tc>
+                <a:tc>
+                  <a:txBody>
+                    <a:bodyPr/>
+                    <a:lstStyle/>
+                    <a:p>
+                      <a:pPr algn="l" fontAlgn="b"/>
+                      <a:endParaRPr lang="pt-BR" sz="1200" b="0" i="0" u="none" strike="noStrike">
+                        <a:solidFill>
+                          <a:srgbClr val="000000"/>
+                        </a:solidFill>
+                        <a:effectLst/>
+                        <a:latin typeface="Calibri" panose="020F0502020204030204" pitchFamily="34" charset="0"/>
+                      </a:endParaRPr>
+                    </a:p>
+                  </a:txBody>
+                  <a:tcPr marL="0" marR="0" marT="0" marB="0" anchor="b">
+                    <a:lnL>
+                      <a:noFill/>
+                    </a:lnL>
+                    <a:lnR>
+                      <a:noFill/>
+                    </a:lnR>
+                    <a:lnT>
+                      <a:noFill/>
+                    </a:lnT>
+                    <a:lnB>
+                      <a:noFill/>
+                    </a:lnB>
+                  </a:tcPr>
+                </a:tc>
+                <a:tc>
+                  <a:txBody>
+                    <a:bodyPr/>
+                    <a:lstStyle/>
+                    <a:p>
+                      <a:pPr algn="l" fontAlgn="b"/>
+                      <a:endParaRPr lang="pt-BR" sz="1200" b="0" i="0" u="none" strike="noStrike">
+                        <a:solidFill>
+                          <a:srgbClr val="000000"/>
+                        </a:solidFill>
+                        <a:effectLst/>
+                        <a:latin typeface="Calibri" panose="020F0502020204030204" pitchFamily="34" charset="0"/>
+                      </a:endParaRPr>
+                    </a:p>
+                  </a:txBody>
+                  <a:tcPr marL="0" marR="0" marT="0" marB="0" anchor="b">
+                    <a:lnL>
+                      <a:noFill/>
+                    </a:lnL>
+                    <a:lnR>
+                      <a:noFill/>
+                    </a:lnR>
+                    <a:lnT>
+                      <a:noFill/>
+                    </a:lnT>
+                    <a:lnB>
+                      <a:noFill/>
+                    </a:lnB>
+                  </a:tcPr>
+                </a:tc>
+                <a:tc>
+                  <a:txBody>
+                    <a:bodyPr/>
+                    <a:lstStyle/>
+                    <a:p>
+                      <a:pPr algn="l" fontAlgn="b"/>
+                      <a:endParaRPr lang="pt-BR" sz="1200" b="0" i="0" u="none" strike="noStrike">
+                        <a:solidFill>
+                          <a:srgbClr val="000000"/>
+                        </a:solidFill>
+                        <a:effectLst/>
+                        <a:latin typeface="Calibri" panose="020F0502020204030204" pitchFamily="34" charset="0"/>
+                      </a:endParaRPr>
+                    </a:p>
+                  </a:txBody>
+                  <a:tcPr marL="0" marR="0" marT="0" marB="0" anchor="b">
+                    <a:lnL>
+                      <a:noFill/>
+                    </a:lnL>
+                    <a:lnR>
+                      <a:noFill/>
+                    </a:lnR>
+                    <a:lnT>
+                      <a:noFill/>
+                    </a:lnT>
+                    <a:lnB>
+                      <a:noFill/>
+                    </a:lnB>
+                  </a:tcPr>
+                </a:tc>
+                <a:tc>
+                  <a:txBody>
+                    <a:bodyPr/>
+                    <a:lstStyle/>
+                    <a:p>
+                      <a:pPr algn="l" fontAlgn="b"/>
+                      <a:endParaRPr lang="pt-BR" sz="1200" b="0" i="0" u="none" strike="noStrike">
+                        <a:solidFill>
+                          <a:srgbClr val="000000"/>
+                        </a:solidFill>
+                        <a:effectLst/>
+                        <a:latin typeface="Calibri" panose="020F0502020204030204" pitchFamily="34" charset="0"/>
+                      </a:endParaRPr>
+                    </a:p>
+                  </a:txBody>
+                  <a:tcPr marL="0" marR="0" marT="0" marB="0" anchor="b">
+                    <a:lnL>
+                      <a:noFill/>
+                    </a:lnL>
+                    <a:lnR>
+                      <a:noFill/>
+                    </a:lnR>
+                    <a:lnT>
+                      <a:noFill/>
+                    </a:lnT>
+                    <a:lnB>
+                      <a:noFill/>
+                    </a:lnB>
+                  </a:tcPr>
+                </a:tc>
+                <a:tc>
+                  <a:txBody>
+                    <a:bodyPr/>
+                    <a:lstStyle/>
+                    <a:p>
+                      <a:pPr algn="l" fontAlgn="b"/>
+                      <a:endParaRPr lang="pt-BR" sz="1200" b="0" i="0" u="none" strike="noStrike">
+                        <a:solidFill>
+                          <a:srgbClr val="000000"/>
+                        </a:solidFill>
+                        <a:effectLst/>
+                        <a:latin typeface="Calibri" panose="020F0502020204030204" pitchFamily="34" charset="0"/>
+                      </a:endParaRPr>
+                    </a:p>
+                  </a:txBody>
+                  <a:tcPr marL="0" marR="0" marT="0" marB="0" anchor="b">
+                    <a:lnL>
+                      <a:noFill/>
+                    </a:lnL>
+                    <a:lnR>
+                      <a:noFill/>
+                    </a:lnR>
+                    <a:lnT>
+                      <a:noFill/>
+                    </a:lnT>
+                    <a:lnB>
+                      <a:noFill/>
+                    </a:lnB>
+                  </a:tcPr>
+                </a:tc>
+                <a:extLst>
+                  <a:ext uri="{0D108BD9-81ED-4DB2-BD59-A6C34878D82A}">
+                    <a16:rowId xmlns:a16="http://schemas.microsoft.com/office/drawing/2014/main" val="939675609"/>
+                  </a:ext>
+                </a:extLst>
+              </a:tr>
+              <a:tr h="312905">
+                <a:tc gridSpan="8">
+                  <a:txBody>
+                    <a:bodyPr/>
+                    <a:lstStyle/>
+                    <a:p>
+                      <a:pPr algn="l" fontAlgn="b"/>
+                      <a:r>
+                        <a:rPr lang="pt-BR" sz="1200" b="0" i="0" u="none" strike="noStrike">
+                          <a:solidFill>
+                            <a:srgbClr val="000000"/>
+                          </a:solidFill>
+                          <a:effectLst/>
+                          <a:latin typeface="Calibri" panose="020F0502020204030204" pitchFamily="34" charset="0"/>
+                        </a:rPr>
+                        <a:t>Definição de horas para envio/recebimento de documentos para as áreas. Por exemplo: Antes de Feriado, Sexta Feira, Recessos.</a:t>
+                      </a:r>
+                    </a:p>
+                  </a:txBody>
+                  <a:tcPr marL="0" marR="0" marT="0" marB="0" anchor="b">
+                    <a:lnL>
+                      <a:noFill/>
+                    </a:lnL>
+                    <a:lnR>
+                      <a:noFill/>
+                    </a:lnR>
+                    <a:lnT>
+                      <a:noFill/>
+                    </a:lnT>
+                    <a:lnB>
+                      <a:noFill/>
+                    </a:lnB>
+                    <a:solidFill>
+                      <a:srgbClr val="F2F2F2"/>
+                    </a:solidFill>
+                  </a:tcPr>
+                </a:tc>
+                <a:tc hMerge="1">
+                  <a:txBody>
+                    <a:bodyPr/>
+                    <a:lstStyle/>
+                    <a:p>
+                      <a:endParaRPr lang="pt-BR"/>
+                    </a:p>
+                  </a:txBody>
+                  <a:tcPr/>
+                </a:tc>
+                <a:tc hMerge="1">
+                  <a:txBody>
+                    <a:bodyPr/>
+                    <a:lstStyle/>
+                    <a:p>
+                      <a:endParaRPr lang="pt-BR"/>
+                    </a:p>
+                  </a:txBody>
+                  <a:tcPr/>
+                </a:tc>
+                <a:tc hMerge="1">
+                  <a:txBody>
+                    <a:bodyPr/>
+                    <a:lstStyle/>
+                    <a:p>
+                      <a:endParaRPr lang="pt-BR"/>
+                    </a:p>
+                  </a:txBody>
+                  <a:tcPr/>
+                </a:tc>
+                <a:tc hMerge="1">
+                  <a:txBody>
+                    <a:bodyPr/>
+                    <a:lstStyle/>
+                    <a:p>
+                      <a:endParaRPr lang="pt-BR"/>
+                    </a:p>
+                  </a:txBody>
+                  <a:tcPr/>
+                </a:tc>
+                <a:tc hMerge="1">
+                  <a:txBody>
+                    <a:bodyPr/>
+                    <a:lstStyle/>
+                    <a:p>
+                      <a:endParaRPr lang="pt-BR"/>
+                    </a:p>
+                  </a:txBody>
+                  <a:tcPr/>
+                </a:tc>
+                <a:tc hMerge="1">
+                  <a:txBody>
+                    <a:bodyPr/>
+                    <a:lstStyle/>
+                    <a:p>
+                      <a:endParaRPr lang="pt-BR"/>
+                    </a:p>
+                  </a:txBody>
+                  <a:tcPr/>
+                </a:tc>
+                <a:tc hMerge="1">
+                  <a:txBody>
+                    <a:bodyPr/>
+                    <a:lstStyle/>
+                    <a:p>
+                      <a:endParaRPr lang="pt-BR"/>
+                    </a:p>
+                  </a:txBody>
+                  <a:tcPr/>
+                </a:tc>
+                <a:tc>
+                  <a:txBody>
+                    <a:bodyPr/>
+                    <a:lstStyle/>
+                    <a:p>
+                      <a:pPr algn="l" fontAlgn="b"/>
+                      <a:r>
+                        <a:rPr lang="pt-BR" sz="1200" b="0" i="0" u="none" strike="noStrike">
+                          <a:solidFill>
+                            <a:srgbClr val="000000"/>
+                          </a:solidFill>
+                          <a:effectLst/>
+                          <a:latin typeface="Calibri" panose="020F0502020204030204" pitchFamily="34" charset="0"/>
+                        </a:rPr>
+                        <a:t> </a:t>
+                      </a:r>
+                    </a:p>
+                  </a:txBody>
+                  <a:tcPr marL="0" marR="0" marT="0" marB="0" anchor="b">
+                    <a:lnL>
+                      <a:noFill/>
+                    </a:lnL>
+                    <a:lnR>
+                      <a:noFill/>
+                    </a:lnR>
+                    <a:lnT>
+                      <a:noFill/>
+                    </a:lnT>
+                    <a:lnB>
+                      <a:noFill/>
+                    </a:lnB>
+                    <a:solidFill>
+                      <a:srgbClr val="F2F2F2"/>
+                    </a:solidFill>
+                  </a:tcPr>
+                </a:tc>
+                <a:tc>
+                  <a:txBody>
+                    <a:bodyPr/>
+                    <a:lstStyle/>
+                    <a:p>
+                      <a:pPr algn="l" fontAlgn="b"/>
+                      <a:endParaRPr lang="pt-BR" sz="1200" b="0" i="0" u="none" strike="noStrike">
+                        <a:solidFill>
+                          <a:srgbClr val="000000"/>
+                        </a:solidFill>
+                        <a:effectLst/>
+                        <a:latin typeface="Calibri" panose="020F0502020204030204" pitchFamily="34" charset="0"/>
+                      </a:endParaRPr>
+                    </a:p>
+                  </a:txBody>
+                  <a:tcPr marL="0" marR="0" marT="0" marB="0" anchor="b">
+                    <a:lnL>
+                      <a:noFill/>
+                    </a:lnL>
+                    <a:lnR>
+                      <a:noFill/>
+                    </a:lnR>
+                    <a:lnT>
+                      <a:noFill/>
+                    </a:lnT>
+                    <a:lnB>
+                      <a:noFill/>
+                    </a:lnB>
+                  </a:tcPr>
+                </a:tc>
+                <a:tc>
+                  <a:txBody>
+                    <a:bodyPr/>
+                    <a:lstStyle/>
+                    <a:p>
+                      <a:pPr algn="l" fontAlgn="b"/>
+                      <a:endParaRPr lang="pt-BR" sz="1200" b="0" i="0" u="none" strike="noStrike">
+                        <a:solidFill>
+                          <a:srgbClr val="000000"/>
+                        </a:solidFill>
+                        <a:effectLst/>
+                        <a:latin typeface="Calibri" panose="020F0502020204030204" pitchFamily="34" charset="0"/>
+                      </a:endParaRPr>
+                    </a:p>
+                  </a:txBody>
+                  <a:tcPr marL="0" marR="0" marT="0" marB="0" anchor="b">
+                    <a:lnL>
+                      <a:noFill/>
+                    </a:lnL>
+                    <a:lnR>
+                      <a:noFill/>
+                    </a:lnR>
+                    <a:lnT>
+                      <a:noFill/>
+                    </a:lnT>
+                    <a:lnB>
+                      <a:noFill/>
+                    </a:lnB>
+                  </a:tcPr>
+                </a:tc>
+                <a:tc>
+                  <a:txBody>
+                    <a:bodyPr/>
+                    <a:lstStyle/>
+                    <a:p>
+                      <a:pPr algn="l" fontAlgn="b"/>
+                      <a:endParaRPr lang="pt-BR" sz="1200" b="0" i="0" u="none" strike="noStrike">
+                        <a:solidFill>
+                          <a:srgbClr val="000000"/>
+                        </a:solidFill>
+                        <a:effectLst/>
+                        <a:latin typeface="Calibri" panose="020F0502020204030204" pitchFamily="34" charset="0"/>
+                      </a:endParaRPr>
+                    </a:p>
+                  </a:txBody>
+                  <a:tcPr marL="0" marR="0" marT="0" marB="0" anchor="b">
+                    <a:lnL>
+                      <a:noFill/>
+                    </a:lnL>
+                    <a:lnR>
+                      <a:noFill/>
+                    </a:lnR>
+                    <a:lnT>
+                      <a:noFill/>
+                    </a:lnT>
+                    <a:lnB>
+                      <a:noFill/>
+                    </a:lnB>
+                  </a:tcPr>
+                </a:tc>
+                <a:tc>
+                  <a:txBody>
+                    <a:bodyPr/>
+                    <a:lstStyle/>
+                    <a:p>
+                      <a:pPr algn="l" fontAlgn="b"/>
+                      <a:endParaRPr lang="pt-BR" sz="1200" b="0" i="0" u="none" strike="noStrike">
+                        <a:solidFill>
+                          <a:srgbClr val="000000"/>
+                        </a:solidFill>
+                        <a:effectLst/>
+                        <a:latin typeface="Calibri" panose="020F0502020204030204" pitchFamily="34" charset="0"/>
+                      </a:endParaRPr>
+                    </a:p>
+                  </a:txBody>
+                  <a:tcPr marL="0" marR="0" marT="0" marB="0" anchor="b">
+                    <a:lnL>
+                      <a:noFill/>
+                    </a:lnL>
+                    <a:lnR>
+                      <a:noFill/>
+                    </a:lnR>
+                    <a:lnT>
+                      <a:noFill/>
+                    </a:lnT>
+                    <a:lnB>
+                      <a:noFill/>
+                    </a:lnB>
+                  </a:tcPr>
+                </a:tc>
+                <a:tc>
+                  <a:txBody>
+                    <a:bodyPr/>
+                    <a:lstStyle/>
+                    <a:p>
+                      <a:pPr algn="l" fontAlgn="b"/>
+                      <a:endParaRPr lang="pt-BR" sz="1200" b="0" i="0" u="none" strike="noStrike">
+                        <a:solidFill>
+                          <a:srgbClr val="000000"/>
+                        </a:solidFill>
+                        <a:effectLst/>
+                        <a:latin typeface="Calibri" panose="020F0502020204030204" pitchFamily="34" charset="0"/>
+                      </a:endParaRPr>
+                    </a:p>
+                  </a:txBody>
+                  <a:tcPr marL="0" marR="0" marT="0" marB="0" anchor="b">
+                    <a:lnL>
+                      <a:noFill/>
+                    </a:lnL>
+                    <a:lnR>
+                      <a:noFill/>
+                    </a:lnR>
+                    <a:lnT>
+                      <a:noFill/>
+                    </a:lnT>
+                    <a:lnB>
+                      <a:noFill/>
+                    </a:lnB>
+                  </a:tcPr>
+                </a:tc>
+                <a:tc>
+                  <a:txBody>
+                    <a:bodyPr/>
+                    <a:lstStyle/>
+                    <a:p>
+                      <a:pPr algn="l" fontAlgn="b"/>
+                      <a:endParaRPr lang="pt-BR" sz="1200" b="0" i="0" u="none" strike="noStrike">
+                        <a:solidFill>
+                          <a:srgbClr val="000000"/>
+                        </a:solidFill>
+                        <a:effectLst/>
+                        <a:latin typeface="Calibri" panose="020F0502020204030204" pitchFamily="34" charset="0"/>
+                      </a:endParaRPr>
+                    </a:p>
+                  </a:txBody>
+                  <a:tcPr marL="0" marR="0" marT="0" marB="0" anchor="b">
+                    <a:lnL>
+                      <a:noFill/>
+                    </a:lnL>
+                    <a:lnR>
+                      <a:noFill/>
+                    </a:lnR>
+                    <a:lnT>
+                      <a:noFill/>
+                    </a:lnT>
+                    <a:lnB>
+                      <a:noFill/>
+                    </a:lnB>
+                  </a:tcPr>
+                </a:tc>
+                <a:extLst>
+                  <a:ext uri="{0D108BD9-81ED-4DB2-BD59-A6C34878D82A}">
+                    <a16:rowId xmlns:a16="http://schemas.microsoft.com/office/drawing/2014/main" val="623495523"/>
+                  </a:ext>
+                </a:extLst>
+              </a:tr>
+              <a:tr h="573975">
+                <a:tc gridSpan="9">
+                  <a:txBody>
+                    <a:bodyPr/>
+                    <a:lstStyle/>
+                    <a:p>
+                      <a:pPr algn="l" fontAlgn="b"/>
+                      <a:r>
+                        <a:rPr lang="pt-BR" sz="1200" b="0" i="0" u="none" strike="noStrike">
+                          <a:solidFill>
+                            <a:srgbClr val="000000"/>
+                          </a:solidFill>
+                          <a:effectLst/>
+                          <a:latin typeface="Calibri" panose="020F0502020204030204" pitchFamily="34" charset="0"/>
+                        </a:rPr>
+                        <a:t>Criação de um repositório de conhecimento onde alterações nos padrões sejam replicadas mais rapidamente e as pessoas sejam notificadas destas mudanças</a:t>
+                      </a:r>
+                    </a:p>
+                  </a:txBody>
+                  <a:tcPr marL="0" marR="0" marT="0" marB="0" anchor="b">
+                    <a:lnL>
+                      <a:noFill/>
+                    </a:lnL>
+                    <a:lnR>
+                      <a:noFill/>
+                    </a:lnR>
+                    <a:lnT>
+                      <a:noFill/>
+                    </a:lnT>
+                    <a:lnB>
+                      <a:noFill/>
+                    </a:lnB>
+                    <a:solidFill>
+                      <a:srgbClr val="F2F2F2"/>
+                    </a:solidFill>
+                  </a:tcPr>
+                </a:tc>
+                <a:tc hMerge="1">
+                  <a:txBody>
+                    <a:bodyPr/>
+                    <a:lstStyle/>
+                    <a:p>
+                      <a:endParaRPr lang="pt-BR"/>
+                    </a:p>
+                  </a:txBody>
+                  <a:tcPr/>
+                </a:tc>
+                <a:tc hMerge="1">
+                  <a:txBody>
+                    <a:bodyPr/>
+                    <a:lstStyle/>
+                    <a:p>
+                      <a:endParaRPr lang="pt-BR"/>
+                    </a:p>
+                  </a:txBody>
+                  <a:tcPr/>
+                </a:tc>
+                <a:tc hMerge="1">
+                  <a:txBody>
+                    <a:bodyPr/>
+                    <a:lstStyle/>
+                    <a:p>
+                      <a:endParaRPr lang="pt-BR"/>
+                    </a:p>
+                  </a:txBody>
+                  <a:tcPr/>
+                </a:tc>
+                <a:tc hMerge="1">
+                  <a:txBody>
+                    <a:bodyPr/>
+                    <a:lstStyle/>
+                    <a:p>
+                      <a:endParaRPr lang="pt-BR"/>
+                    </a:p>
+                  </a:txBody>
+                  <a:tcPr/>
+                </a:tc>
+                <a:tc hMerge="1">
+                  <a:txBody>
+                    <a:bodyPr/>
+                    <a:lstStyle/>
+                    <a:p>
+                      <a:endParaRPr lang="pt-BR"/>
+                    </a:p>
+                  </a:txBody>
+                  <a:tcPr/>
+                </a:tc>
+                <a:tc hMerge="1">
+                  <a:txBody>
+                    <a:bodyPr/>
+                    <a:lstStyle/>
+                    <a:p>
+                      <a:endParaRPr lang="pt-BR"/>
+                    </a:p>
+                  </a:txBody>
+                  <a:tcPr/>
+                </a:tc>
+                <a:tc hMerge="1">
+                  <a:txBody>
+                    <a:bodyPr/>
+                    <a:lstStyle/>
+                    <a:p>
+                      <a:endParaRPr lang="pt-BR"/>
+                    </a:p>
+                  </a:txBody>
+                  <a:tcPr/>
+                </a:tc>
+                <a:tc hMerge="1">
+                  <a:txBody>
+                    <a:bodyPr/>
+                    <a:lstStyle/>
+                    <a:p>
+                      <a:endParaRPr lang="pt-BR"/>
+                    </a:p>
+                  </a:txBody>
+                  <a:tcPr/>
+                </a:tc>
+                <a:tc>
+                  <a:txBody>
+                    <a:bodyPr/>
+                    <a:lstStyle/>
+                    <a:p>
+                      <a:pPr algn="l" fontAlgn="b"/>
+                      <a:endParaRPr lang="pt-BR" sz="1200" b="0" i="0" u="none" strike="noStrike">
+                        <a:solidFill>
+                          <a:srgbClr val="000000"/>
+                        </a:solidFill>
+                        <a:effectLst/>
+                        <a:latin typeface="Calibri" panose="020F0502020204030204" pitchFamily="34" charset="0"/>
+                      </a:endParaRPr>
+                    </a:p>
+                  </a:txBody>
+                  <a:tcPr marL="0" marR="0" marT="0" marB="0" anchor="b">
+                    <a:lnL>
+                      <a:noFill/>
+                    </a:lnL>
+                    <a:lnR>
+                      <a:noFill/>
+                    </a:lnR>
+                    <a:lnT>
+                      <a:noFill/>
+                    </a:lnT>
+                    <a:lnB>
+                      <a:noFill/>
+                    </a:lnB>
+                  </a:tcPr>
+                </a:tc>
+                <a:tc>
+                  <a:txBody>
+                    <a:bodyPr/>
+                    <a:lstStyle/>
+                    <a:p>
+                      <a:pPr algn="l" fontAlgn="b"/>
+                      <a:endParaRPr lang="pt-BR" sz="1200" b="0" i="0" u="none" strike="noStrike">
+                        <a:solidFill>
+                          <a:srgbClr val="000000"/>
+                        </a:solidFill>
+                        <a:effectLst/>
+                        <a:latin typeface="Calibri" panose="020F0502020204030204" pitchFamily="34" charset="0"/>
+                      </a:endParaRPr>
+                    </a:p>
+                  </a:txBody>
+                  <a:tcPr marL="0" marR="0" marT="0" marB="0" anchor="b">
+                    <a:lnL>
+                      <a:noFill/>
+                    </a:lnL>
+                    <a:lnR>
+                      <a:noFill/>
+                    </a:lnR>
+                    <a:lnT>
+                      <a:noFill/>
+                    </a:lnT>
+                    <a:lnB>
+                      <a:noFill/>
+                    </a:lnB>
+                  </a:tcPr>
+                </a:tc>
+                <a:tc>
+                  <a:txBody>
+                    <a:bodyPr/>
+                    <a:lstStyle/>
+                    <a:p>
+                      <a:pPr algn="l" fontAlgn="b"/>
+                      <a:endParaRPr lang="pt-BR" sz="1200" b="0" i="0" u="none" strike="noStrike">
+                        <a:solidFill>
+                          <a:srgbClr val="000000"/>
+                        </a:solidFill>
+                        <a:effectLst/>
+                        <a:latin typeface="Calibri" panose="020F0502020204030204" pitchFamily="34" charset="0"/>
+                      </a:endParaRPr>
+                    </a:p>
+                  </a:txBody>
+                  <a:tcPr marL="0" marR="0" marT="0" marB="0" anchor="b">
+                    <a:lnL>
+                      <a:noFill/>
+                    </a:lnL>
+                    <a:lnR>
+                      <a:noFill/>
+                    </a:lnR>
+                    <a:lnT>
+                      <a:noFill/>
+                    </a:lnT>
+                    <a:lnB>
+                      <a:noFill/>
+                    </a:lnB>
+                  </a:tcPr>
+                </a:tc>
+                <a:tc>
+                  <a:txBody>
+                    <a:bodyPr/>
+                    <a:lstStyle/>
+                    <a:p>
+                      <a:pPr algn="l" fontAlgn="b"/>
+                      <a:endParaRPr lang="pt-BR" sz="1200" b="0" i="0" u="none" strike="noStrike">
+                        <a:solidFill>
+                          <a:srgbClr val="000000"/>
+                        </a:solidFill>
+                        <a:effectLst/>
+                        <a:latin typeface="Calibri" panose="020F0502020204030204" pitchFamily="34" charset="0"/>
+                      </a:endParaRPr>
+                    </a:p>
+                  </a:txBody>
+                  <a:tcPr marL="0" marR="0" marT="0" marB="0" anchor="b">
+                    <a:lnL>
+                      <a:noFill/>
+                    </a:lnL>
+                    <a:lnR>
+                      <a:noFill/>
+                    </a:lnR>
+                    <a:lnT>
+                      <a:noFill/>
+                    </a:lnT>
+                    <a:lnB>
+                      <a:noFill/>
+                    </a:lnB>
+                  </a:tcPr>
+                </a:tc>
+                <a:tc>
+                  <a:txBody>
+                    <a:bodyPr/>
+                    <a:lstStyle/>
+                    <a:p>
+                      <a:pPr algn="l" fontAlgn="b"/>
+                      <a:endParaRPr lang="pt-BR" sz="1200" b="0" i="0" u="none" strike="noStrike">
+                        <a:solidFill>
+                          <a:srgbClr val="000000"/>
+                        </a:solidFill>
+                        <a:effectLst/>
+                        <a:latin typeface="Calibri" panose="020F0502020204030204" pitchFamily="34" charset="0"/>
+                      </a:endParaRPr>
+                    </a:p>
+                  </a:txBody>
+                  <a:tcPr marL="0" marR="0" marT="0" marB="0" anchor="b">
+                    <a:lnL>
+                      <a:noFill/>
+                    </a:lnL>
+                    <a:lnR>
+                      <a:noFill/>
+                    </a:lnR>
+                    <a:lnT>
+                      <a:noFill/>
+                    </a:lnT>
+                    <a:lnB>
+                      <a:noFill/>
+                    </a:lnB>
+                  </a:tcPr>
+                </a:tc>
+                <a:tc>
+                  <a:txBody>
+                    <a:bodyPr/>
+                    <a:lstStyle/>
+                    <a:p>
+                      <a:pPr algn="l" fontAlgn="b"/>
+                      <a:endParaRPr lang="pt-BR" sz="1200" b="0" i="0" u="none" strike="noStrike">
+                        <a:solidFill>
+                          <a:srgbClr val="000000"/>
+                        </a:solidFill>
+                        <a:effectLst/>
+                        <a:latin typeface="Calibri" panose="020F0502020204030204" pitchFamily="34" charset="0"/>
+                      </a:endParaRPr>
+                    </a:p>
+                  </a:txBody>
+                  <a:tcPr marL="0" marR="0" marT="0" marB="0" anchor="b">
+                    <a:lnL>
+                      <a:noFill/>
+                    </a:lnL>
+                    <a:lnR>
+                      <a:noFill/>
+                    </a:lnR>
+                    <a:lnT>
+                      <a:noFill/>
+                    </a:lnT>
+                    <a:lnB>
+                      <a:noFill/>
+                    </a:lnB>
+                  </a:tcPr>
+                </a:tc>
+                <a:extLst>
+                  <a:ext uri="{0D108BD9-81ED-4DB2-BD59-A6C34878D82A}">
+                    <a16:rowId xmlns:a16="http://schemas.microsoft.com/office/drawing/2014/main" val="3492161654"/>
+                  </a:ext>
+                </a:extLst>
+              </a:tr>
+              <a:tr h="312905">
+                <a:tc gridSpan="6">
+                  <a:txBody>
+                    <a:bodyPr/>
+                    <a:lstStyle/>
+                    <a:p>
+                      <a:pPr algn="l" fontAlgn="b"/>
+                      <a:r>
+                        <a:rPr lang="pt-BR" sz="1200" b="0" i="0" u="none" strike="noStrike">
+                          <a:solidFill>
+                            <a:srgbClr val="000000"/>
+                          </a:solidFill>
+                          <a:effectLst/>
+                          <a:latin typeface="Calibri" panose="020F0502020204030204" pitchFamily="34" charset="0"/>
+                        </a:rPr>
+                        <a:t>Utilização de tecnicas de desenvolvimento agil como ( Kanban e Stand Up meetings ) para alinhar o trabalho. </a:t>
+                      </a:r>
+                    </a:p>
+                  </a:txBody>
+                  <a:tcPr marL="0" marR="0" marT="0" marB="0" anchor="b">
+                    <a:lnL>
+                      <a:noFill/>
+                    </a:lnL>
+                    <a:lnR>
+                      <a:noFill/>
+                    </a:lnR>
+                    <a:lnT>
+                      <a:noFill/>
+                    </a:lnT>
+                    <a:lnB>
+                      <a:noFill/>
+                    </a:lnB>
+                  </a:tcPr>
+                </a:tc>
+                <a:tc hMerge="1">
+                  <a:txBody>
+                    <a:bodyPr/>
+                    <a:lstStyle/>
+                    <a:p>
+                      <a:endParaRPr lang="pt-BR"/>
+                    </a:p>
+                  </a:txBody>
+                  <a:tcPr/>
+                </a:tc>
+                <a:tc hMerge="1">
+                  <a:txBody>
+                    <a:bodyPr/>
+                    <a:lstStyle/>
+                    <a:p>
+                      <a:endParaRPr lang="pt-BR"/>
+                    </a:p>
+                  </a:txBody>
+                  <a:tcPr/>
+                </a:tc>
+                <a:tc hMerge="1">
+                  <a:txBody>
+                    <a:bodyPr/>
+                    <a:lstStyle/>
+                    <a:p>
+                      <a:endParaRPr lang="pt-BR"/>
+                    </a:p>
+                  </a:txBody>
+                  <a:tcPr/>
+                </a:tc>
+                <a:tc hMerge="1">
+                  <a:txBody>
+                    <a:bodyPr/>
+                    <a:lstStyle/>
+                    <a:p>
+                      <a:endParaRPr lang="pt-BR"/>
+                    </a:p>
+                  </a:txBody>
+                  <a:tcPr/>
+                </a:tc>
+                <a:tc hMerge="1">
+                  <a:txBody>
+                    <a:bodyPr/>
+                    <a:lstStyle/>
+                    <a:p>
+                      <a:endParaRPr lang="pt-BR"/>
+                    </a:p>
+                  </a:txBody>
+                  <a:tcPr/>
+                </a:tc>
+                <a:tc>
+                  <a:txBody>
+                    <a:bodyPr/>
+                    <a:lstStyle/>
+                    <a:p>
+                      <a:pPr algn="l" fontAlgn="b"/>
+                      <a:endParaRPr lang="pt-BR" sz="1200" b="0" i="0" u="none" strike="noStrike">
+                        <a:solidFill>
+                          <a:srgbClr val="000000"/>
+                        </a:solidFill>
+                        <a:effectLst/>
+                        <a:latin typeface="Calibri" panose="020F0502020204030204" pitchFamily="34" charset="0"/>
+                      </a:endParaRPr>
+                    </a:p>
+                  </a:txBody>
+                  <a:tcPr marL="0" marR="0" marT="0" marB="0" anchor="b">
+                    <a:lnL>
+                      <a:noFill/>
+                    </a:lnL>
+                    <a:lnR>
+                      <a:noFill/>
+                    </a:lnR>
+                    <a:lnT>
+                      <a:noFill/>
+                    </a:lnT>
+                    <a:lnB>
+                      <a:noFill/>
+                    </a:lnB>
+                  </a:tcPr>
+                </a:tc>
+                <a:tc>
+                  <a:txBody>
+                    <a:bodyPr/>
+                    <a:lstStyle/>
+                    <a:p>
+                      <a:pPr algn="l" fontAlgn="b"/>
+                      <a:endParaRPr lang="pt-BR" sz="1200" b="0" i="0" u="none" strike="noStrike">
+                        <a:solidFill>
+                          <a:srgbClr val="000000"/>
+                        </a:solidFill>
+                        <a:effectLst/>
+                        <a:latin typeface="Calibri" panose="020F0502020204030204" pitchFamily="34" charset="0"/>
+                      </a:endParaRPr>
+                    </a:p>
+                  </a:txBody>
+                  <a:tcPr marL="0" marR="0" marT="0" marB="0" anchor="b">
+                    <a:lnL>
+                      <a:noFill/>
+                    </a:lnL>
+                    <a:lnR>
+                      <a:noFill/>
+                    </a:lnR>
+                    <a:lnT>
+                      <a:noFill/>
+                    </a:lnT>
+                    <a:lnB>
+                      <a:noFill/>
+                    </a:lnB>
+                  </a:tcPr>
+                </a:tc>
+                <a:tc>
+                  <a:txBody>
+                    <a:bodyPr/>
+                    <a:lstStyle/>
+                    <a:p>
+                      <a:pPr algn="l" fontAlgn="b"/>
+                      <a:endParaRPr lang="pt-BR" sz="1200" b="0" i="0" u="none" strike="noStrike">
+                        <a:solidFill>
+                          <a:srgbClr val="000000"/>
+                        </a:solidFill>
+                        <a:effectLst/>
+                        <a:latin typeface="Calibri" panose="020F0502020204030204" pitchFamily="34" charset="0"/>
+                      </a:endParaRPr>
+                    </a:p>
+                  </a:txBody>
+                  <a:tcPr marL="0" marR="0" marT="0" marB="0" anchor="b">
+                    <a:lnL>
+                      <a:noFill/>
+                    </a:lnL>
+                    <a:lnR>
+                      <a:noFill/>
+                    </a:lnR>
+                    <a:lnT>
+                      <a:noFill/>
+                    </a:lnT>
+                    <a:lnB>
+                      <a:noFill/>
+                    </a:lnB>
+                  </a:tcPr>
+                </a:tc>
+                <a:tc>
+                  <a:txBody>
+                    <a:bodyPr/>
+                    <a:lstStyle/>
+                    <a:p>
+                      <a:pPr algn="l" fontAlgn="b"/>
+                      <a:endParaRPr lang="pt-BR" sz="1200" b="0" i="0" u="none" strike="noStrike">
+                        <a:solidFill>
+                          <a:srgbClr val="000000"/>
+                        </a:solidFill>
+                        <a:effectLst/>
+                        <a:latin typeface="Calibri" panose="020F0502020204030204" pitchFamily="34" charset="0"/>
+                      </a:endParaRPr>
+                    </a:p>
+                  </a:txBody>
+                  <a:tcPr marL="0" marR="0" marT="0" marB="0" anchor="b">
+                    <a:lnL>
+                      <a:noFill/>
+                    </a:lnL>
+                    <a:lnR>
+                      <a:noFill/>
+                    </a:lnR>
+                    <a:lnT>
+                      <a:noFill/>
+                    </a:lnT>
+                    <a:lnB>
+                      <a:noFill/>
+                    </a:lnB>
+                  </a:tcPr>
+                </a:tc>
+                <a:tc>
+                  <a:txBody>
+                    <a:bodyPr/>
+                    <a:lstStyle/>
+                    <a:p>
+                      <a:pPr algn="l" fontAlgn="b"/>
+                      <a:endParaRPr lang="pt-BR" sz="1200" b="0" i="0" u="none" strike="noStrike">
+                        <a:solidFill>
+                          <a:srgbClr val="000000"/>
+                        </a:solidFill>
+                        <a:effectLst/>
+                        <a:latin typeface="Calibri" panose="020F0502020204030204" pitchFamily="34" charset="0"/>
+                      </a:endParaRPr>
+                    </a:p>
+                  </a:txBody>
+                  <a:tcPr marL="0" marR="0" marT="0" marB="0" anchor="b">
+                    <a:lnL>
+                      <a:noFill/>
+                    </a:lnL>
+                    <a:lnR>
+                      <a:noFill/>
+                    </a:lnR>
+                    <a:lnT>
+                      <a:noFill/>
+                    </a:lnT>
+                    <a:lnB>
+                      <a:noFill/>
+                    </a:lnB>
+                  </a:tcPr>
+                </a:tc>
+                <a:tc>
+                  <a:txBody>
+                    <a:bodyPr/>
+                    <a:lstStyle/>
+                    <a:p>
+                      <a:pPr algn="l" fontAlgn="b"/>
+                      <a:endParaRPr lang="pt-BR" sz="1200" b="0" i="0" u="none" strike="noStrike">
+                        <a:solidFill>
+                          <a:srgbClr val="000000"/>
+                        </a:solidFill>
+                        <a:effectLst/>
+                        <a:latin typeface="Calibri" panose="020F0502020204030204" pitchFamily="34" charset="0"/>
+                      </a:endParaRPr>
+                    </a:p>
+                  </a:txBody>
+                  <a:tcPr marL="0" marR="0" marT="0" marB="0" anchor="b">
+                    <a:lnL>
+                      <a:noFill/>
+                    </a:lnL>
+                    <a:lnR>
+                      <a:noFill/>
+                    </a:lnR>
+                    <a:lnT>
+                      <a:noFill/>
+                    </a:lnT>
+                    <a:lnB>
+                      <a:noFill/>
+                    </a:lnB>
+                  </a:tcPr>
+                </a:tc>
+                <a:tc>
+                  <a:txBody>
+                    <a:bodyPr/>
+                    <a:lstStyle/>
+                    <a:p>
+                      <a:pPr algn="l" fontAlgn="b"/>
+                      <a:endParaRPr lang="pt-BR" sz="1200" b="0" i="0" u="none" strike="noStrike">
+                        <a:solidFill>
+                          <a:srgbClr val="000000"/>
+                        </a:solidFill>
+                        <a:effectLst/>
+                        <a:latin typeface="Calibri" panose="020F0502020204030204" pitchFamily="34" charset="0"/>
+                      </a:endParaRPr>
+                    </a:p>
+                  </a:txBody>
+                  <a:tcPr marL="0" marR="0" marT="0" marB="0" anchor="b">
+                    <a:lnL>
+                      <a:noFill/>
+                    </a:lnL>
+                    <a:lnR>
+                      <a:noFill/>
+                    </a:lnR>
+                    <a:lnT>
+                      <a:noFill/>
+                    </a:lnT>
+                    <a:lnB>
+                      <a:noFill/>
+                    </a:lnB>
+                  </a:tcPr>
+                </a:tc>
+                <a:tc>
+                  <a:txBody>
+                    <a:bodyPr/>
+                    <a:lstStyle/>
+                    <a:p>
+                      <a:pPr algn="l" fontAlgn="b"/>
+                      <a:endParaRPr lang="pt-BR" sz="1200" b="0" i="0" u="none" strike="noStrike">
+                        <a:solidFill>
+                          <a:srgbClr val="000000"/>
+                        </a:solidFill>
+                        <a:effectLst/>
+                        <a:latin typeface="Calibri" panose="020F0502020204030204" pitchFamily="34" charset="0"/>
+                      </a:endParaRPr>
+                    </a:p>
+                  </a:txBody>
+                  <a:tcPr marL="0" marR="0" marT="0" marB="0" anchor="b">
+                    <a:lnL>
+                      <a:noFill/>
+                    </a:lnL>
+                    <a:lnR>
+                      <a:noFill/>
+                    </a:lnR>
+                    <a:lnT>
+                      <a:noFill/>
+                    </a:lnT>
+                    <a:lnB>
+                      <a:noFill/>
+                    </a:lnB>
+                  </a:tcPr>
+                </a:tc>
+                <a:tc>
+                  <a:txBody>
+                    <a:bodyPr/>
+                    <a:lstStyle/>
+                    <a:p>
+                      <a:pPr algn="l" fontAlgn="b"/>
+                      <a:endParaRPr lang="pt-BR" sz="1200" b="0" i="0" u="none" strike="noStrike">
+                        <a:solidFill>
+                          <a:srgbClr val="000000"/>
+                        </a:solidFill>
+                        <a:effectLst/>
+                        <a:latin typeface="Calibri" panose="020F0502020204030204" pitchFamily="34" charset="0"/>
+                      </a:endParaRPr>
+                    </a:p>
+                  </a:txBody>
+                  <a:tcPr marL="0" marR="0" marT="0" marB="0" anchor="b">
+                    <a:lnL>
+                      <a:noFill/>
+                    </a:lnL>
+                    <a:lnR>
+                      <a:noFill/>
+                    </a:lnR>
+                    <a:lnT>
+                      <a:noFill/>
+                    </a:lnT>
+                    <a:lnB>
+                      <a:noFill/>
+                    </a:lnB>
+                  </a:tcPr>
+                </a:tc>
+                <a:extLst>
+                  <a:ext uri="{0D108BD9-81ED-4DB2-BD59-A6C34878D82A}">
+                    <a16:rowId xmlns:a16="http://schemas.microsoft.com/office/drawing/2014/main" val="3259447469"/>
+                  </a:ext>
+                </a:extLst>
+              </a:tr>
+              <a:tr h="312905">
+                <a:tc gridSpan="13">
+                  <a:txBody>
+                    <a:bodyPr/>
+                    <a:lstStyle/>
+                    <a:p>
+                      <a:pPr algn="l" fontAlgn="b"/>
+                      <a:r>
+                        <a:rPr lang="pt-BR" sz="1200" b="0" i="0" u="none" strike="noStrike">
+                          <a:solidFill>
+                            <a:srgbClr val="000000"/>
+                          </a:solidFill>
+                          <a:effectLst/>
+                          <a:latin typeface="Calibri" panose="020F0502020204030204" pitchFamily="34" charset="0"/>
+                        </a:rPr>
+                        <a:t>Organização da pasta de conhecimento K onde estão contidos os modelos de documento. Todos precisam ser notificados quando houver alterações de forma automática. </a:t>
+                      </a:r>
+                    </a:p>
+                  </a:txBody>
+                  <a:tcPr marL="0" marR="0" marT="0" marB="0" anchor="b">
+                    <a:lnL>
+                      <a:noFill/>
+                    </a:lnL>
+                    <a:lnR>
+                      <a:noFill/>
+                    </a:lnR>
+                    <a:lnT>
+                      <a:noFill/>
+                    </a:lnT>
+                    <a:lnB>
+                      <a:noFill/>
+                    </a:lnB>
+                  </a:tcPr>
+                </a:tc>
+                <a:tc hMerge="1">
+                  <a:txBody>
+                    <a:bodyPr/>
+                    <a:lstStyle/>
+                    <a:p>
+                      <a:endParaRPr lang="pt-BR"/>
+                    </a:p>
+                  </a:txBody>
+                  <a:tcPr/>
+                </a:tc>
+                <a:tc hMerge="1">
+                  <a:txBody>
+                    <a:bodyPr/>
+                    <a:lstStyle/>
+                    <a:p>
+                      <a:endParaRPr lang="pt-BR"/>
+                    </a:p>
+                  </a:txBody>
+                  <a:tcPr/>
+                </a:tc>
+                <a:tc hMerge="1">
+                  <a:txBody>
+                    <a:bodyPr/>
+                    <a:lstStyle/>
+                    <a:p>
+                      <a:endParaRPr lang="pt-BR"/>
+                    </a:p>
+                  </a:txBody>
+                  <a:tcPr/>
+                </a:tc>
+                <a:tc hMerge="1">
+                  <a:txBody>
+                    <a:bodyPr/>
+                    <a:lstStyle/>
+                    <a:p>
+                      <a:endParaRPr lang="pt-BR"/>
+                    </a:p>
+                  </a:txBody>
+                  <a:tcPr/>
+                </a:tc>
+                <a:tc hMerge="1">
+                  <a:txBody>
+                    <a:bodyPr/>
+                    <a:lstStyle/>
+                    <a:p>
+                      <a:endParaRPr lang="pt-BR"/>
+                    </a:p>
+                  </a:txBody>
+                  <a:tcPr/>
+                </a:tc>
+                <a:tc hMerge="1">
+                  <a:txBody>
+                    <a:bodyPr/>
+                    <a:lstStyle/>
+                    <a:p>
+                      <a:endParaRPr lang="pt-BR"/>
+                    </a:p>
+                  </a:txBody>
+                  <a:tcPr/>
+                </a:tc>
+                <a:tc hMerge="1">
+                  <a:txBody>
+                    <a:bodyPr/>
+                    <a:lstStyle/>
+                    <a:p>
+                      <a:endParaRPr lang="pt-BR"/>
+                    </a:p>
+                  </a:txBody>
+                  <a:tcPr/>
+                </a:tc>
+                <a:tc hMerge="1">
+                  <a:txBody>
+                    <a:bodyPr/>
+                    <a:lstStyle/>
+                    <a:p>
+                      <a:endParaRPr lang="pt-BR"/>
+                    </a:p>
+                  </a:txBody>
+                  <a:tcPr/>
+                </a:tc>
+                <a:tc hMerge="1">
+                  <a:txBody>
+                    <a:bodyPr/>
+                    <a:lstStyle/>
+                    <a:p>
+                      <a:endParaRPr lang="pt-BR"/>
+                    </a:p>
+                  </a:txBody>
+                  <a:tcPr/>
+                </a:tc>
+                <a:tc hMerge="1">
+                  <a:txBody>
+                    <a:bodyPr/>
+                    <a:lstStyle/>
+                    <a:p>
+                      <a:endParaRPr lang="pt-BR"/>
+                    </a:p>
+                  </a:txBody>
+                  <a:tcPr/>
+                </a:tc>
+                <a:tc hMerge="1">
+                  <a:txBody>
+                    <a:bodyPr/>
+                    <a:lstStyle/>
+                    <a:p>
+                      <a:endParaRPr lang="pt-BR"/>
+                    </a:p>
+                  </a:txBody>
+                  <a:tcPr/>
+                </a:tc>
+                <a:tc hMerge="1">
+                  <a:txBody>
+                    <a:bodyPr/>
+                    <a:lstStyle/>
+                    <a:p>
+                      <a:endParaRPr lang="pt-BR"/>
+                    </a:p>
+                  </a:txBody>
+                  <a:tcPr/>
+                </a:tc>
+                <a:tc>
+                  <a:txBody>
+                    <a:bodyPr/>
+                    <a:lstStyle/>
+                    <a:p>
+                      <a:pPr algn="l" fontAlgn="b"/>
+                      <a:endParaRPr lang="pt-BR" sz="1200" b="0" i="0" u="none" strike="noStrike">
+                        <a:solidFill>
+                          <a:srgbClr val="000000"/>
+                        </a:solidFill>
+                        <a:effectLst/>
+                        <a:latin typeface="Calibri" panose="020F0502020204030204" pitchFamily="34" charset="0"/>
+                      </a:endParaRPr>
+                    </a:p>
+                  </a:txBody>
+                  <a:tcPr marL="0" marR="0" marT="0" marB="0" anchor="b">
+                    <a:lnL>
+                      <a:noFill/>
+                    </a:lnL>
+                    <a:lnR>
+                      <a:noFill/>
+                    </a:lnR>
+                    <a:lnT>
+                      <a:noFill/>
+                    </a:lnT>
+                    <a:lnB>
+                      <a:noFill/>
+                    </a:lnB>
+                  </a:tcPr>
+                </a:tc>
+                <a:tc>
+                  <a:txBody>
+                    <a:bodyPr/>
+                    <a:lstStyle/>
+                    <a:p>
+                      <a:pPr algn="l" fontAlgn="b"/>
+                      <a:endParaRPr lang="pt-BR" sz="1200" b="0" i="0" u="none" strike="noStrike">
+                        <a:solidFill>
+                          <a:srgbClr val="000000"/>
+                        </a:solidFill>
+                        <a:effectLst/>
+                        <a:latin typeface="Calibri" panose="020F0502020204030204" pitchFamily="34" charset="0"/>
+                      </a:endParaRPr>
+                    </a:p>
+                  </a:txBody>
+                  <a:tcPr marL="0" marR="0" marT="0" marB="0" anchor="b">
+                    <a:lnL>
+                      <a:noFill/>
+                    </a:lnL>
+                    <a:lnR>
+                      <a:noFill/>
+                    </a:lnR>
+                    <a:lnT>
+                      <a:noFill/>
+                    </a:lnT>
+                    <a:lnB>
+                      <a:noFill/>
+                    </a:lnB>
+                  </a:tcPr>
+                </a:tc>
+                <a:extLst>
+                  <a:ext uri="{0D108BD9-81ED-4DB2-BD59-A6C34878D82A}">
+                    <a16:rowId xmlns:a16="http://schemas.microsoft.com/office/drawing/2014/main" val="1832681166"/>
+                  </a:ext>
+                </a:extLst>
+              </a:tr>
+              <a:tr h="312905">
+                <a:tc gridSpan="15">
+                  <a:txBody>
+                    <a:bodyPr/>
+                    <a:lstStyle/>
+                    <a:p>
+                      <a:pPr algn="l" fontAlgn="b"/>
+                      <a:r>
+                        <a:rPr lang="pt-BR" sz="1200" b="0" i="0" u="none" strike="noStrike" dirty="0">
+                          <a:solidFill>
+                            <a:srgbClr val="000000"/>
+                          </a:solidFill>
+                          <a:effectLst/>
+                          <a:latin typeface="Calibri" panose="020F0502020204030204" pitchFamily="34" charset="0"/>
+                        </a:rPr>
+                        <a:t>Alterações nos modelos de checklist e Documentos precisam ser atualizados no site do TRE e todos precisam referir ao mesmo em caso de dúvidas. A versão valida e aprovada deve estar no site.</a:t>
+                      </a:r>
+                    </a:p>
+                  </a:txBody>
+                  <a:tcPr marL="0" marR="0" marT="0" marB="0" anchor="b">
+                    <a:lnL>
+                      <a:noFill/>
+                    </a:lnL>
+                    <a:lnR>
+                      <a:noFill/>
+                    </a:lnR>
+                    <a:lnT>
+                      <a:noFill/>
+                    </a:lnT>
+                    <a:lnB>
+                      <a:noFill/>
+                    </a:lnB>
+                  </a:tcPr>
+                </a:tc>
+                <a:tc hMerge="1">
+                  <a:txBody>
+                    <a:bodyPr/>
+                    <a:lstStyle/>
+                    <a:p>
+                      <a:endParaRPr lang="pt-BR"/>
+                    </a:p>
+                  </a:txBody>
+                  <a:tcPr/>
+                </a:tc>
+                <a:tc hMerge="1">
+                  <a:txBody>
+                    <a:bodyPr/>
+                    <a:lstStyle/>
+                    <a:p>
+                      <a:endParaRPr lang="pt-BR"/>
+                    </a:p>
+                  </a:txBody>
+                  <a:tcPr/>
+                </a:tc>
+                <a:tc hMerge="1">
+                  <a:txBody>
+                    <a:bodyPr/>
+                    <a:lstStyle/>
+                    <a:p>
+                      <a:endParaRPr lang="pt-BR"/>
+                    </a:p>
+                  </a:txBody>
+                  <a:tcPr/>
+                </a:tc>
+                <a:tc hMerge="1">
+                  <a:txBody>
+                    <a:bodyPr/>
+                    <a:lstStyle/>
+                    <a:p>
+                      <a:endParaRPr lang="pt-BR"/>
+                    </a:p>
+                  </a:txBody>
+                  <a:tcPr/>
+                </a:tc>
+                <a:tc hMerge="1">
+                  <a:txBody>
+                    <a:bodyPr/>
+                    <a:lstStyle/>
+                    <a:p>
+                      <a:endParaRPr lang="pt-BR"/>
+                    </a:p>
+                  </a:txBody>
+                  <a:tcPr/>
+                </a:tc>
+                <a:tc hMerge="1">
+                  <a:txBody>
+                    <a:bodyPr/>
+                    <a:lstStyle/>
+                    <a:p>
+                      <a:endParaRPr lang="pt-BR"/>
+                    </a:p>
+                  </a:txBody>
+                  <a:tcPr/>
+                </a:tc>
+                <a:tc hMerge="1">
+                  <a:txBody>
+                    <a:bodyPr/>
+                    <a:lstStyle/>
+                    <a:p>
+                      <a:endParaRPr lang="pt-BR"/>
+                    </a:p>
+                  </a:txBody>
+                  <a:tcPr/>
+                </a:tc>
+                <a:tc hMerge="1">
+                  <a:txBody>
+                    <a:bodyPr/>
+                    <a:lstStyle/>
+                    <a:p>
+                      <a:endParaRPr lang="pt-BR"/>
+                    </a:p>
+                  </a:txBody>
+                  <a:tcPr/>
+                </a:tc>
+                <a:tc hMerge="1">
+                  <a:txBody>
+                    <a:bodyPr/>
+                    <a:lstStyle/>
+                    <a:p>
+                      <a:endParaRPr lang="pt-BR"/>
+                    </a:p>
+                  </a:txBody>
+                  <a:tcPr/>
+                </a:tc>
+                <a:tc hMerge="1">
+                  <a:txBody>
+                    <a:bodyPr/>
+                    <a:lstStyle/>
+                    <a:p>
+                      <a:endParaRPr lang="pt-BR"/>
+                    </a:p>
+                  </a:txBody>
+                  <a:tcPr/>
+                </a:tc>
+                <a:tc hMerge="1">
+                  <a:txBody>
+                    <a:bodyPr/>
+                    <a:lstStyle/>
+                    <a:p>
+                      <a:endParaRPr lang="pt-BR"/>
+                    </a:p>
+                  </a:txBody>
+                  <a:tcPr/>
+                </a:tc>
+                <a:tc hMerge="1">
+                  <a:txBody>
+                    <a:bodyPr/>
+                    <a:lstStyle/>
+                    <a:p>
+                      <a:endParaRPr lang="pt-BR"/>
+                    </a:p>
+                  </a:txBody>
+                  <a:tcPr/>
+                </a:tc>
+                <a:tc hMerge="1">
+                  <a:txBody>
+                    <a:bodyPr/>
+                    <a:lstStyle/>
+                    <a:p>
+                      <a:endParaRPr lang="pt-BR"/>
+                    </a:p>
+                  </a:txBody>
+                  <a:tcPr/>
+                </a:tc>
+                <a:tc hMerge="1">
+                  <a:txBody>
+                    <a:bodyPr/>
+                    <a:lstStyle/>
+                    <a:p>
+                      <a:endParaRPr lang="pt-BR"/>
+                    </a:p>
+                  </a:txBody>
+                  <a:tcPr/>
+                </a:tc>
+                <a:extLst>
+                  <a:ext uri="{0D108BD9-81ED-4DB2-BD59-A6C34878D82A}">
+                    <a16:rowId xmlns:a16="http://schemas.microsoft.com/office/drawing/2014/main" val="1466212511"/>
+                  </a:ext>
+                </a:extLst>
+              </a:tr>
+            </a:tbl>
+          </a:graphicData>
+        </a:graphic>
+      </p:graphicFrame>
     </p:spTree>
     <p:extLst>
       <p:ext uri="{BB962C8B-B14F-4D97-AF65-F5344CB8AC3E}">
@@ -4391,13 +7778,643 @@
   <p:clrMapOvr>
     <a:masterClrMapping/>
   </p:clrMapOvr>
-  <p:timing>
-    <p:tnLst>
-      <p:par>
-        <p:cTn id="1" dur="indefinite" restart="never" nodeType="tmRoot"/>
-      </p:par>
-    </p:tnLst>
-  </p:timing>
+</p:sld>
+</file>
+
+<file path=ppt/slides/slide5.xml><?xml version="1.0" encoding="utf-8"?>
+<p:sld xmlns:a="http://schemas.openxmlformats.org/drawingml/2006/main" xmlns:r="http://schemas.openxmlformats.org/officeDocument/2006/relationships" xmlns:p="http://schemas.openxmlformats.org/presentationml/2006/main">
+  <p:cSld>
+    <p:spTree>
+      <p:nvGrpSpPr>
+        <p:cNvPr id="1" name=""/>
+        <p:cNvGrpSpPr/>
+        <p:nvPr/>
+      </p:nvGrpSpPr>
+      <p:grpSpPr>
+        <a:xfrm>
+          <a:off x="0" y="0"/>
+          <a:ext cx="0" cy="0"/>
+          <a:chOff x="0" y="0"/>
+          <a:chExt cx="0" cy="0"/>
+        </a:xfrm>
+      </p:grpSpPr>
+      <p:sp>
+        <p:nvSpPr>
+          <p:cNvPr id="2" name="Title 1"/>
+          <p:cNvSpPr>
+            <a:spLocks noGrp="1"/>
+          </p:cNvSpPr>
+          <p:nvPr>
+            <p:ph type="title"/>
+          </p:nvPr>
+        </p:nvSpPr>
+        <p:spPr/>
+        <p:txBody>
+          <a:bodyPr/>
+          <a:lstStyle/>
+          <a:p>
+            <a:r>
+              <a:rPr lang="en-US" dirty="0" err="1"/>
+              <a:t>Perguntas</a:t>
+            </a:r>
+            <a:endParaRPr lang="en-US" dirty="0"/>
+          </a:p>
+        </p:txBody>
+      </p:sp>
+      <p:sp>
+        <p:nvSpPr>
+          <p:cNvPr id="3" name="Content Placeholder 2"/>
+          <p:cNvSpPr>
+            <a:spLocks noGrp="1"/>
+          </p:cNvSpPr>
+          <p:nvPr>
+            <p:ph idx="1"/>
+          </p:nvPr>
+        </p:nvSpPr>
+        <p:spPr/>
+        <p:txBody>
+          <a:bodyPr/>
+          <a:lstStyle/>
+          <a:p>
+            <a:r>
+              <a:rPr lang="en-US" dirty="0" err="1"/>
+              <a:t>Será</a:t>
+            </a:r>
+            <a:r>
+              <a:rPr lang="en-US" dirty="0"/>
+              <a:t> </a:t>
+            </a:r>
+            <a:r>
+              <a:rPr lang="en-US" dirty="0" err="1"/>
+              <a:t>necessário</a:t>
+            </a:r>
+            <a:r>
+              <a:rPr lang="en-US" dirty="0"/>
+              <a:t> </a:t>
+            </a:r>
+            <a:r>
+              <a:rPr lang="en-US" dirty="0" err="1"/>
+              <a:t>priorizar</a:t>
+            </a:r>
+            <a:r>
+              <a:rPr lang="en-US" dirty="0"/>
+              <a:t> as </a:t>
+            </a:r>
+            <a:r>
+              <a:rPr lang="en-US" dirty="0" err="1"/>
+              <a:t>soluções</a:t>
+            </a:r>
+            <a:r>
+              <a:rPr lang="en-US" dirty="0"/>
+              <a:t>?</a:t>
+            </a:r>
+          </a:p>
+          <a:p>
+            <a:endParaRPr lang="en-US" dirty="0"/>
+          </a:p>
+          <a:p>
+            <a:endParaRPr lang="en-US" dirty="0"/>
+          </a:p>
+        </p:txBody>
+      </p:sp>
+      <p:pic>
+        <p:nvPicPr>
+          <p:cNvPr id="5" name="Picture 4">
+            <a:extLst>
+              <a:ext uri="{FF2B5EF4-FFF2-40B4-BE49-F238E27FC236}">
+                <a16:creationId xmlns:a16="http://schemas.microsoft.com/office/drawing/2014/main" id="{888C128C-5269-4983-8E62-782CC3812D38}"/>
+              </a:ext>
+            </a:extLst>
+          </p:cNvPr>
+          <p:cNvPicPr>
+            <a:picLocks noChangeAspect="1"/>
+          </p:cNvPicPr>
+          <p:nvPr/>
+        </p:nvPicPr>
+        <p:blipFill>
+          <a:blip r:embed="rId2"/>
+          <a:stretch>
+            <a:fillRect/>
+          </a:stretch>
+        </p:blipFill>
+        <p:spPr>
+          <a:xfrm>
+            <a:off x="362602" y="2190512"/>
+            <a:ext cx="7941717" cy="4146750"/>
+          </a:xfrm>
+          <a:prstGeom prst="rect">
+            <a:avLst/>
+          </a:prstGeom>
+        </p:spPr>
+      </p:pic>
+      <p:pic>
+        <p:nvPicPr>
+          <p:cNvPr id="13" name="Picture 12">
+            <a:extLst>
+              <a:ext uri="{FF2B5EF4-FFF2-40B4-BE49-F238E27FC236}">
+                <a16:creationId xmlns:a16="http://schemas.microsoft.com/office/drawing/2014/main" id="{73590F63-BD5D-42CA-B0B8-B95CFD1D1E88}"/>
+              </a:ext>
+            </a:extLst>
+          </p:cNvPr>
+          <p:cNvPicPr>
+            <a:picLocks noChangeAspect="1"/>
+          </p:cNvPicPr>
+          <p:nvPr/>
+        </p:nvPicPr>
+        <p:blipFill>
+          <a:blip r:embed="rId3"/>
+          <a:stretch>
+            <a:fillRect/>
+          </a:stretch>
+        </p:blipFill>
+        <p:spPr>
+          <a:xfrm>
+            <a:off x="8587698" y="5106410"/>
+            <a:ext cx="1920645" cy="1230851"/>
+          </a:xfrm>
+          <a:prstGeom prst="rect">
+            <a:avLst/>
+          </a:prstGeom>
+        </p:spPr>
+      </p:pic>
+      <p:pic>
+        <p:nvPicPr>
+          <p:cNvPr id="15" name="Picture 14">
+            <a:extLst>
+              <a:ext uri="{FF2B5EF4-FFF2-40B4-BE49-F238E27FC236}">
+                <a16:creationId xmlns:a16="http://schemas.microsoft.com/office/drawing/2014/main" id="{9E17D4F8-F869-438F-8B2F-1D0060775FAE}"/>
+              </a:ext>
+            </a:extLst>
+          </p:cNvPr>
+          <p:cNvPicPr>
+            <a:picLocks noChangeAspect="1"/>
+          </p:cNvPicPr>
+          <p:nvPr/>
+        </p:nvPicPr>
+        <p:blipFill>
+          <a:blip r:embed="rId4"/>
+          <a:stretch>
+            <a:fillRect/>
+          </a:stretch>
+        </p:blipFill>
+        <p:spPr>
+          <a:xfrm>
+            <a:off x="8587697" y="2389567"/>
+            <a:ext cx="1802007" cy="1377177"/>
+          </a:xfrm>
+          <a:prstGeom prst="rect">
+            <a:avLst/>
+          </a:prstGeom>
+        </p:spPr>
+      </p:pic>
+      <p:pic>
+        <p:nvPicPr>
+          <p:cNvPr id="17" name="Picture 16">
+            <a:extLst>
+              <a:ext uri="{FF2B5EF4-FFF2-40B4-BE49-F238E27FC236}">
+                <a16:creationId xmlns:a16="http://schemas.microsoft.com/office/drawing/2014/main" id="{3771CBCC-4773-4B79-A0BD-54DC02307FFC}"/>
+              </a:ext>
+            </a:extLst>
+          </p:cNvPr>
+          <p:cNvPicPr>
+            <a:picLocks noChangeAspect="1"/>
+          </p:cNvPicPr>
+          <p:nvPr/>
+        </p:nvPicPr>
+        <p:blipFill>
+          <a:blip r:embed="rId5"/>
+          <a:stretch>
+            <a:fillRect/>
+          </a:stretch>
+        </p:blipFill>
+        <p:spPr>
+          <a:xfrm>
+            <a:off x="8513665" y="3842772"/>
+            <a:ext cx="1950069" cy="1187610"/>
+          </a:xfrm>
+          <a:prstGeom prst="rect">
+            <a:avLst/>
+          </a:prstGeom>
+        </p:spPr>
+      </p:pic>
+    </p:spTree>
+    <p:extLst>
+      <p:ext uri="{BB962C8B-B14F-4D97-AF65-F5344CB8AC3E}">
+        <p14:creationId xmlns:p14="http://schemas.microsoft.com/office/powerpoint/2010/main" val="1358830760"/>
+      </p:ext>
+    </p:extLst>
+  </p:cSld>
+  <p:clrMapOvr>
+    <a:masterClrMapping/>
+  </p:clrMapOvr>
+</p:sld>
+</file>
+
+<file path=ppt/slides/slide6.xml><?xml version="1.0" encoding="utf-8"?>
+<p:sld xmlns:a="http://schemas.openxmlformats.org/drawingml/2006/main" xmlns:r="http://schemas.openxmlformats.org/officeDocument/2006/relationships" xmlns:p="http://schemas.openxmlformats.org/presentationml/2006/main">
+  <p:cSld>
+    <p:spTree>
+      <p:nvGrpSpPr>
+        <p:cNvPr id="1" name=""/>
+        <p:cNvGrpSpPr/>
+        <p:nvPr/>
+      </p:nvGrpSpPr>
+      <p:grpSpPr>
+        <a:xfrm>
+          <a:off x="0" y="0"/>
+          <a:ext cx="0" cy="0"/>
+          <a:chOff x="0" y="0"/>
+          <a:chExt cx="0" cy="0"/>
+        </a:xfrm>
+      </p:grpSpPr>
+      <p:sp>
+        <p:nvSpPr>
+          <p:cNvPr id="2" name="Title 1"/>
+          <p:cNvSpPr>
+            <a:spLocks noGrp="1"/>
+          </p:cNvSpPr>
+          <p:nvPr>
+            <p:ph type="title"/>
+          </p:nvPr>
+        </p:nvSpPr>
+        <p:spPr>
+          <a:xfrm>
+            <a:off x="1097280" y="203334"/>
+            <a:ext cx="10058400" cy="1450757"/>
+          </a:xfrm>
+        </p:spPr>
+        <p:txBody>
+          <a:bodyPr/>
+          <a:lstStyle/>
+          <a:p>
+            <a:r>
+              <a:rPr lang="en-US" dirty="0" err="1"/>
+              <a:t>Perguntas</a:t>
+            </a:r>
+            <a:endParaRPr lang="en-US" dirty="0"/>
+          </a:p>
+        </p:txBody>
+      </p:sp>
+      <p:sp>
+        <p:nvSpPr>
+          <p:cNvPr id="3" name="Content Placeholder 2"/>
+          <p:cNvSpPr>
+            <a:spLocks noGrp="1"/>
+          </p:cNvSpPr>
+          <p:nvPr>
+            <p:ph idx="1"/>
+          </p:nvPr>
+        </p:nvSpPr>
+        <p:spPr/>
+        <p:txBody>
+          <a:bodyPr/>
+          <a:lstStyle/>
+          <a:p>
+            <a:r>
+              <a:rPr lang="en-US" dirty="0"/>
+              <a:t>As </a:t>
+            </a:r>
+            <a:r>
+              <a:rPr lang="en-US" dirty="0" err="1"/>
+              <a:t>soluções</a:t>
+            </a:r>
+            <a:r>
+              <a:rPr lang="en-US" dirty="0"/>
+              <a:t> </a:t>
+            </a:r>
+            <a:r>
+              <a:rPr lang="en-US" dirty="0" err="1"/>
+              <a:t>apresentam</a:t>
+            </a:r>
+            <a:r>
+              <a:rPr lang="en-US" dirty="0"/>
+              <a:t> </a:t>
+            </a:r>
+            <a:r>
+              <a:rPr lang="en-US" dirty="0" err="1"/>
+              <a:t>algum</a:t>
+            </a:r>
+            <a:r>
+              <a:rPr lang="en-US" dirty="0"/>
+              <a:t> </a:t>
+            </a:r>
+            <a:r>
+              <a:rPr lang="en-US" dirty="0" err="1"/>
+              <a:t>risco</a:t>
+            </a:r>
+            <a:r>
+              <a:rPr lang="en-US" dirty="0"/>
+              <a:t>?</a:t>
+            </a:r>
+          </a:p>
+          <a:p>
+            <a:endParaRPr lang="en-US" dirty="0"/>
+          </a:p>
+          <a:p>
+            <a:endParaRPr lang="en-US" dirty="0"/>
+          </a:p>
+        </p:txBody>
+      </p:sp>
+      <p:pic>
+        <p:nvPicPr>
+          <p:cNvPr id="6" name="Picture 5">
+            <a:extLst>
+              <a:ext uri="{FF2B5EF4-FFF2-40B4-BE49-F238E27FC236}">
+                <a16:creationId xmlns:a16="http://schemas.microsoft.com/office/drawing/2014/main" id="{E2E712D8-ABDF-480A-9FF1-633E9857B3F0}"/>
+              </a:ext>
+            </a:extLst>
+          </p:cNvPr>
+          <p:cNvPicPr>
+            <a:picLocks noChangeAspect="1"/>
+          </p:cNvPicPr>
+          <p:nvPr/>
+        </p:nvPicPr>
+        <p:blipFill>
+          <a:blip r:embed="rId2"/>
+          <a:stretch>
+            <a:fillRect/>
+          </a:stretch>
+        </p:blipFill>
+        <p:spPr>
+          <a:xfrm>
+            <a:off x="0" y="2146852"/>
+            <a:ext cx="12192000" cy="4231415"/>
+          </a:xfrm>
+          <a:prstGeom prst="rect">
+            <a:avLst/>
+          </a:prstGeom>
+        </p:spPr>
+      </p:pic>
+    </p:spTree>
+    <p:extLst>
+      <p:ext uri="{BB962C8B-B14F-4D97-AF65-F5344CB8AC3E}">
+        <p14:creationId xmlns:p14="http://schemas.microsoft.com/office/powerpoint/2010/main" val="4191231944"/>
+      </p:ext>
+    </p:extLst>
+  </p:cSld>
+  <p:clrMapOvr>
+    <a:masterClrMapping/>
+  </p:clrMapOvr>
+</p:sld>
+</file>
+
+<file path=ppt/slides/slide7.xml><?xml version="1.0" encoding="utf-8"?>
+<p:sld xmlns:a="http://schemas.openxmlformats.org/drawingml/2006/main" xmlns:r="http://schemas.openxmlformats.org/officeDocument/2006/relationships" xmlns:p="http://schemas.openxmlformats.org/presentationml/2006/main">
+  <p:cSld>
+    <p:spTree>
+      <p:nvGrpSpPr>
+        <p:cNvPr id="1" name=""/>
+        <p:cNvGrpSpPr/>
+        <p:nvPr/>
+      </p:nvGrpSpPr>
+      <p:grpSpPr>
+        <a:xfrm>
+          <a:off x="0" y="0"/>
+          <a:ext cx="0" cy="0"/>
+          <a:chOff x="0" y="0"/>
+          <a:chExt cx="0" cy="0"/>
+        </a:xfrm>
+      </p:grpSpPr>
+      <p:sp>
+        <p:nvSpPr>
+          <p:cNvPr id="2" name="Title 1"/>
+          <p:cNvSpPr>
+            <a:spLocks noGrp="1"/>
+          </p:cNvSpPr>
+          <p:nvPr>
+            <p:ph type="title"/>
+          </p:nvPr>
+        </p:nvSpPr>
+        <p:spPr>
+          <a:xfrm>
+            <a:off x="1097280" y="203334"/>
+            <a:ext cx="10058400" cy="1450757"/>
+          </a:xfrm>
+        </p:spPr>
+        <p:txBody>
+          <a:bodyPr/>
+          <a:lstStyle/>
+          <a:p>
+            <a:r>
+              <a:rPr lang="en-US" dirty="0" err="1"/>
+              <a:t>Perguntas</a:t>
+            </a:r>
+            <a:endParaRPr lang="en-US" dirty="0"/>
+          </a:p>
+        </p:txBody>
+      </p:sp>
+      <p:sp>
+        <p:nvSpPr>
+          <p:cNvPr id="3" name="Content Placeholder 2"/>
+          <p:cNvSpPr>
+            <a:spLocks noGrp="1"/>
+          </p:cNvSpPr>
+          <p:nvPr>
+            <p:ph idx="1"/>
+          </p:nvPr>
+        </p:nvSpPr>
+        <p:spPr/>
+        <p:txBody>
+          <a:bodyPr/>
+          <a:lstStyle/>
+          <a:p>
+            <a:r>
+              <a:rPr lang="en-US" dirty="0"/>
+              <a:t>Como </a:t>
+            </a:r>
+            <a:r>
+              <a:rPr lang="en-US" dirty="0" err="1"/>
+              <a:t>os</a:t>
+            </a:r>
+            <a:r>
+              <a:rPr lang="en-US" dirty="0"/>
+              <a:t> testes </a:t>
+            </a:r>
+            <a:r>
+              <a:rPr lang="en-US" dirty="0" err="1"/>
+              <a:t>serão</a:t>
+            </a:r>
+            <a:r>
+              <a:rPr lang="en-US" dirty="0"/>
+              <a:t> </a:t>
+            </a:r>
+            <a:r>
+              <a:rPr lang="en-US" dirty="0" err="1"/>
+              <a:t>implementados</a:t>
+            </a:r>
+            <a:r>
+              <a:rPr lang="en-US" dirty="0"/>
+              <a:t>?</a:t>
+            </a:r>
+          </a:p>
+          <a:p>
+            <a:endParaRPr lang="en-US" dirty="0"/>
+          </a:p>
+          <a:p>
+            <a:pPr marL="0" indent="0">
+              <a:buNone/>
+            </a:pPr>
+            <a:endParaRPr lang="en-US" dirty="0"/>
+          </a:p>
+        </p:txBody>
+      </p:sp>
+      <p:pic>
+        <p:nvPicPr>
+          <p:cNvPr id="5" name="Picture 4">
+            <a:extLst>
+              <a:ext uri="{FF2B5EF4-FFF2-40B4-BE49-F238E27FC236}">
+                <a16:creationId xmlns:a16="http://schemas.microsoft.com/office/drawing/2014/main" id="{148C46F3-81E6-4A3A-89DB-4BC510B252D8}"/>
+              </a:ext>
+            </a:extLst>
+          </p:cNvPr>
+          <p:cNvPicPr>
+            <a:picLocks noChangeAspect="1"/>
+          </p:cNvPicPr>
+          <p:nvPr/>
+        </p:nvPicPr>
+        <p:blipFill>
+          <a:blip r:embed="rId2"/>
+          <a:stretch>
+            <a:fillRect/>
+          </a:stretch>
+        </p:blipFill>
+        <p:spPr>
+          <a:xfrm>
+            <a:off x="0" y="2133600"/>
+            <a:ext cx="12192000" cy="4165600"/>
+          </a:xfrm>
+          <a:prstGeom prst="rect">
+            <a:avLst/>
+          </a:prstGeom>
+        </p:spPr>
+      </p:pic>
+    </p:spTree>
+    <p:extLst>
+      <p:ext uri="{BB962C8B-B14F-4D97-AF65-F5344CB8AC3E}">
+        <p14:creationId xmlns:p14="http://schemas.microsoft.com/office/powerpoint/2010/main" val="3825737845"/>
+      </p:ext>
+    </p:extLst>
+  </p:cSld>
+  <p:clrMapOvr>
+    <a:masterClrMapping/>
+  </p:clrMapOvr>
+</p:sld>
+</file>
+
+<file path=ppt/slides/slide8.xml><?xml version="1.0" encoding="utf-8"?>
+<p:sld xmlns:a="http://schemas.openxmlformats.org/drawingml/2006/main" xmlns:r="http://schemas.openxmlformats.org/officeDocument/2006/relationships" xmlns:p="http://schemas.openxmlformats.org/presentationml/2006/main">
+  <p:cSld>
+    <p:spTree>
+      <p:nvGrpSpPr>
+        <p:cNvPr id="1" name=""/>
+        <p:cNvGrpSpPr/>
+        <p:nvPr/>
+      </p:nvGrpSpPr>
+      <p:grpSpPr>
+        <a:xfrm>
+          <a:off x="0" y="0"/>
+          <a:ext cx="0" cy="0"/>
+          <a:chOff x="0" y="0"/>
+          <a:chExt cx="0" cy="0"/>
+        </a:xfrm>
+      </p:grpSpPr>
+      <p:sp>
+        <p:nvSpPr>
+          <p:cNvPr id="2" name="Title 1">
+            <a:extLst>
+              <a:ext uri="{FF2B5EF4-FFF2-40B4-BE49-F238E27FC236}">
+                <a16:creationId xmlns:a16="http://schemas.microsoft.com/office/drawing/2014/main" id="{14FD8A25-4DBE-4720-B0A5-CC412E200981}"/>
+              </a:ext>
+            </a:extLst>
+          </p:cNvPr>
+          <p:cNvSpPr>
+            <a:spLocks noGrp="1"/>
+          </p:cNvSpPr>
+          <p:nvPr>
+            <p:ph type="title"/>
+          </p:nvPr>
+        </p:nvSpPr>
+        <p:spPr/>
+        <p:txBody>
+          <a:bodyPr/>
+          <a:lstStyle/>
+          <a:p>
+            <a:r>
+              <a:rPr lang="pt-BR" dirty="0"/>
+              <a:t>Dicas Revisões arquivos- Aba Revisão</a:t>
+            </a:r>
+          </a:p>
+        </p:txBody>
+      </p:sp>
+      <p:pic>
+        <p:nvPicPr>
+          <p:cNvPr id="5" name="Content Placeholder 4" descr="Alarme monitorado PB PAD 1811 16.docx - Word">
+            <a:extLst>
+              <a:ext uri="{FF2B5EF4-FFF2-40B4-BE49-F238E27FC236}">
+                <a16:creationId xmlns:a16="http://schemas.microsoft.com/office/drawing/2014/main" id="{007AD428-C1A0-4962-8116-8113725EAFDD}"/>
+              </a:ext>
+            </a:extLst>
+          </p:cNvPr>
+          <p:cNvPicPr>
+            <a:picLocks noGrp="1" noChangeAspect="1"/>
+          </p:cNvPicPr>
+          <p:nvPr>
+            <p:ph idx="1"/>
+          </p:nvPr>
+        </p:nvPicPr>
+        <p:blipFill>
+          <a:blip r:embed="rId2"/>
+          <a:stretch>
+            <a:fillRect/>
+          </a:stretch>
+        </p:blipFill>
+        <p:spPr>
+          <a:xfrm>
+            <a:off x="749889" y="1737361"/>
+            <a:ext cx="3971307" cy="2137954"/>
+          </a:xfrm>
+        </p:spPr>
+      </p:pic>
+      <p:pic>
+        <p:nvPicPr>
+          <p:cNvPr id="7" name="Picture 6" descr="Alarme monitorado PB PAD 1811 16.docx - Word">
+            <a:extLst>
+              <a:ext uri="{FF2B5EF4-FFF2-40B4-BE49-F238E27FC236}">
+                <a16:creationId xmlns:a16="http://schemas.microsoft.com/office/drawing/2014/main" id="{F9524CB6-4404-429A-A2C4-4E8087636E96}"/>
+              </a:ext>
+            </a:extLst>
+          </p:cNvPr>
+          <p:cNvPicPr>
+            <a:picLocks noChangeAspect="1"/>
+          </p:cNvPicPr>
+          <p:nvPr/>
+        </p:nvPicPr>
+        <p:blipFill>
+          <a:blip r:embed="rId3"/>
+          <a:stretch>
+            <a:fillRect/>
+          </a:stretch>
+        </p:blipFill>
+        <p:spPr>
+          <a:xfrm>
+            <a:off x="4721196" y="1849273"/>
+            <a:ext cx="6981371" cy="3758423"/>
+          </a:xfrm>
+          <a:prstGeom prst="rect">
+            <a:avLst/>
+          </a:prstGeom>
+        </p:spPr>
+      </p:pic>
+    </p:spTree>
+    <p:extLst>
+      <p:ext uri="{BB962C8B-B14F-4D97-AF65-F5344CB8AC3E}">
+        <p14:creationId xmlns:p14="http://schemas.microsoft.com/office/powerpoint/2010/main" val="3172872878"/>
+      </p:ext>
+    </p:extLst>
+  </p:cSld>
+  <p:clrMapOvr>
+    <a:masterClrMapping/>
+  </p:clrMapOvr>
 </p:sld>
 </file>
 

</xml_diff>